<commit_message>
Aaaahhhhhh des fautes d'orthographe
</commit_message>
<xml_diff>
--- a/Presentation Cloud.pptx
+++ b/Presentation Cloud.pptx
@@ -1345,7 +1345,7 @@
           <a:noFill/>
           <a:extLst>
             <a:ext uri="{909E8E84-426E-40dd-AFC4-6F175D3DCCD1}">
-              <a14:hiddenFill xmlns:a14="http://schemas.microsoft.com/office/drawing/2010/main" xmlns="">
+              <a14:hiddenFill xmlns="" xmlns:a14="http://schemas.microsoft.com/office/drawing/2010/main">
                 <a:solidFill>
                   <a:srgbClr val="FFFFFF"/>
                 </a:solidFill>
@@ -1405,7 +1405,7 @@
             </a:ln>
             <a:extLst>
               <a:ext uri="{91240B29-F687-4f45-9708-019B960494DF}">
-                <a14:hiddenLine xmlns:a14="http://schemas.microsoft.com/office/drawing/2010/main" xmlns="" w="9525">
+                <a14:hiddenLine xmlns="" xmlns:a14="http://schemas.microsoft.com/office/drawing/2010/main" w="9525">
                   <a:solidFill>
                     <a:srgbClr val="000000"/>
                   </a:solidFill>
@@ -1495,7 +1495,7 @@
             </a:ln>
             <a:extLst>
               <a:ext uri="{91240B29-F687-4f45-9708-019B960494DF}">
-                <a14:hiddenLine xmlns:a14="http://schemas.microsoft.com/office/drawing/2010/main" xmlns="" w="9525">
+                <a14:hiddenLine xmlns="" xmlns:a14="http://schemas.microsoft.com/office/drawing/2010/main" w="9525">
                   <a:solidFill>
                     <a:srgbClr val="000000"/>
                   </a:solidFill>
@@ -1585,7 +1585,7 @@
             </a:ln>
             <a:extLst>
               <a:ext uri="{91240B29-F687-4f45-9708-019B960494DF}">
-                <a14:hiddenLine xmlns:a14="http://schemas.microsoft.com/office/drawing/2010/main" xmlns="" w="9525">
+                <a14:hiddenLine xmlns="" xmlns:a14="http://schemas.microsoft.com/office/drawing/2010/main" w="9525">
                   <a:solidFill>
                     <a:srgbClr val="000000"/>
                   </a:solidFill>
@@ -1619,7 +1619,7 @@
             </a:ln>
             <a:extLst>
               <a:ext uri="{91240B29-F687-4f45-9708-019B960494DF}">
-                <a14:hiddenLine xmlns:a14="http://schemas.microsoft.com/office/drawing/2010/main" xmlns="" w="9525">
+                <a14:hiddenLine xmlns="" xmlns:a14="http://schemas.microsoft.com/office/drawing/2010/main" w="9525">
                   <a:solidFill>
                     <a:srgbClr val="000000"/>
                   </a:solidFill>
@@ -1709,7 +1709,7 @@
             </a:ln>
             <a:extLst>
               <a:ext uri="{91240B29-F687-4f45-9708-019B960494DF}">
-                <a14:hiddenLine xmlns:a14="http://schemas.microsoft.com/office/drawing/2010/main" xmlns="" w="9525">
+                <a14:hiddenLine xmlns="" xmlns:a14="http://schemas.microsoft.com/office/drawing/2010/main" w="9525">
                   <a:solidFill>
                     <a:srgbClr val="000000"/>
                   </a:solidFill>
@@ -1771,7 +1771,7 @@
             </a:ln>
             <a:extLst>
               <a:ext uri="{91240B29-F687-4f45-9708-019B960494DF}">
-                <a14:hiddenLine xmlns:a14="http://schemas.microsoft.com/office/drawing/2010/main" xmlns="" w="9525">
+                <a14:hiddenLine xmlns="" xmlns:a14="http://schemas.microsoft.com/office/drawing/2010/main" w="9525">
                   <a:solidFill>
                     <a:srgbClr val="000000"/>
                   </a:solidFill>
@@ -1833,7 +1833,7 @@
             </a:ln>
             <a:extLst>
               <a:ext uri="{91240B29-F687-4f45-9708-019B960494DF}">
-                <a14:hiddenLine xmlns:a14="http://schemas.microsoft.com/office/drawing/2010/main" xmlns="" w="9525">
+                <a14:hiddenLine xmlns="" xmlns:a14="http://schemas.microsoft.com/office/drawing/2010/main" w="9525">
                   <a:solidFill>
                     <a:srgbClr val="000000"/>
                   </a:solidFill>
@@ -1923,7 +1923,7 @@
             </a:ln>
             <a:extLst>
               <a:ext uri="{91240B29-F687-4f45-9708-019B960494DF}">
-                <a14:hiddenLine xmlns:a14="http://schemas.microsoft.com/office/drawing/2010/main" xmlns="" w="9525">
+                <a14:hiddenLine xmlns="" xmlns:a14="http://schemas.microsoft.com/office/drawing/2010/main" w="9525">
                   <a:solidFill>
                     <a:srgbClr val="000000"/>
                   </a:solidFill>
@@ -1985,7 +1985,7 @@
             </a:ln>
             <a:extLst>
               <a:ext uri="{91240B29-F687-4f45-9708-019B960494DF}">
-                <a14:hiddenLine xmlns:a14="http://schemas.microsoft.com/office/drawing/2010/main" xmlns="" w="9525">
+                <a14:hiddenLine xmlns="" xmlns:a14="http://schemas.microsoft.com/office/drawing/2010/main" w="9525">
                   <a:solidFill>
                     <a:srgbClr val="000000"/>
                   </a:solidFill>
@@ -2047,7 +2047,7 @@
             </a:ln>
             <a:extLst>
               <a:ext uri="{91240B29-F687-4f45-9708-019B960494DF}">
-                <a14:hiddenLine xmlns:a14="http://schemas.microsoft.com/office/drawing/2010/main" xmlns="" w="9525">
+                <a14:hiddenLine xmlns="" xmlns:a14="http://schemas.microsoft.com/office/drawing/2010/main" w="9525">
                   <a:solidFill>
                     <a:srgbClr val="000000"/>
                   </a:solidFill>
@@ -2137,7 +2137,7 @@
             </a:ln>
             <a:extLst>
               <a:ext uri="{91240B29-F687-4f45-9708-019B960494DF}">
-                <a14:hiddenLine xmlns:a14="http://schemas.microsoft.com/office/drawing/2010/main" xmlns="" w="9525">
+                <a14:hiddenLine xmlns="" xmlns:a14="http://schemas.microsoft.com/office/drawing/2010/main" w="9525">
                   <a:solidFill>
                     <a:srgbClr val="000000"/>
                   </a:solidFill>
@@ -2227,7 +2227,7 @@
             </a:ln>
             <a:extLst>
               <a:ext uri="{91240B29-F687-4f45-9708-019B960494DF}">
-                <a14:hiddenLine xmlns:a14="http://schemas.microsoft.com/office/drawing/2010/main" xmlns="" w="9525">
+                <a14:hiddenLine xmlns="" xmlns:a14="http://schemas.microsoft.com/office/drawing/2010/main" w="9525">
                   <a:solidFill>
                     <a:srgbClr val="000000"/>
                   </a:solidFill>
@@ -2289,7 +2289,7 @@
             </a:ln>
             <a:extLst>
               <a:ext uri="{91240B29-F687-4f45-9708-019B960494DF}">
-                <a14:hiddenLine xmlns:a14="http://schemas.microsoft.com/office/drawing/2010/main" xmlns="" w="9525">
+                <a14:hiddenLine xmlns="" xmlns:a14="http://schemas.microsoft.com/office/drawing/2010/main" w="9525">
                   <a:solidFill>
                     <a:srgbClr val="000000"/>
                   </a:solidFill>
@@ -2399,7 +2399,7 @@
             </a:ln>
             <a:extLst>
               <a:ext uri="{91240B29-F687-4f45-9708-019B960494DF}">
-                <a14:hiddenLine xmlns:a14="http://schemas.microsoft.com/office/drawing/2010/main" xmlns="" w="9525">
+                <a14:hiddenLine xmlns="" xmlns:a14="http://schemas.microsoft.com/office/drawing/2010/main" w="9525">
                   <a:solidFill>
                     <a:srgbClr val="000000"/>
                   </a:solidFill>
@@ -2461,7 +2461,7 @@
             </a:ln>
             <a:extLst>
               <a:ext uri="{91240B29-F687-4f45-9708-019B960494DF}">
-                <a14:hiddenLine xmlns:a14="http://schemas.microsoft.com/office/drawing/2010/main" xmlns="" w="9525">
+                <a14:hiddenLine xmlns="" xmlns:a14="http://schemas.microsoft.com/office/drawing/2010/main" w="9525">
                   <a:solidFill>
                     <a:srgbClr val="000000"/>
                   </a:solidFill>
@@ -2551,7 +2551,7 @@
             </a:ln>
             <a:extLst>
               <a:ext uri="{91240B29-F687-4f45-9708-019B960494DF}">
-                <a14:hiddenLine xmlns:a14="http://schemas.microsoft.com/office/drawing/2010/main" xmlns="" w="9525">
+                <a14:hiddenLine xmlns="" xmlns:a14="http://schemas.microsoft.com/office/drawing/2010/main" w="9525">
                   <a:solidFill>
                     <a:srgbClr val="000000"/>
                   </a:solidFill>
@@ -2641,7 +2641,7 @@
             </a:ln>
             <a:extLst>
               <a:ext uri="{91240B29-F687-4f45-9708-019B960494DF}">
-                <a14:hiddenLine xmlns:a14="http://schemas.microsoft.com/office/drawing/2010/main" xmlns="" w="9525">
+                <a14:hiddenLine xmlns="" xmlns:a14="http://schemas.microsoft.com/office/drawing/2010/main" w="9525">
                   <a:solidFill>
                     <a:srgbClr val="000000"/>
                   </a:solidFill>
@@ -2703,7 +2703,7 @@
             </a:ln>
             <a:extLst>
               <a:ext uri="{91240B29-F687-4f45-9708-019B960494DF}">
-                <a14:hiddenLine xmlns:a14="http://schemas.microsoft.com/office/drawing/2010/main" xmlns="" w="9525">
+                <a14:hiddenLine xmlns="" xmlns:a14="http://schemas.microsoft.com/office/drawing/2010/main" w="9525">
                   <a:solidFill>
                     <a:srgbClr val="000000"/>
                   </a:solidFill>
@@ -2793,7 +2793,7 @@
             </a:ln>
             <a:extLst>
               <a:ext uri="{91240B29-F687-4f45-9708-019B960494DF}">
-                <a14:hiddenLine xmlns:a14="http://schemas.microsoft.com/office/drawing/2010/main" xmlns="" w="9525">
+                <a14:hiddenLine xmlns="" xmlns:a14="http://schemas.microsoft.com/office/drawing/2010/main" w="9525">
                   <a:solidFill>
                     <a:srgbClr val="000000"/>
                   </a:solidFill>
@@ -2883,7 +2883,7 @@
             </a:ln>
             <a:extLst>
               <a:ext uri="{91240B29-F687-4f45-9708-019B960494DF}">
-                <a14:hiddenLine xmlns:a14="http://schemas.microsoft.com/office/drawing/2010/main" xmlns="" w="9525">
+                <a14:hiddenLine xmlns="" xmlns:a14="http://schemas.microsoft.com/office/drawing/2010/main" w="9525">
                   <a:solidFill>
                     <a:srgbClr val="000000"/>
                   </a:solidFill>
@@ -2939,7 +2939,7 @@
             </a:ln>
             <a:extLst>
               <a:ext uri="{91240B29-F687-4f45-9708-019B960494DF}">
-                <a14:hiddenLine xmlns:a14="http://schemas.microsoft.com/office/drawing/2010/main" xmlns="" w="9525">
+                <a14:hiddenLine xmlns="" xmlns:a14="http://schemas.microsoft.com/office/drawing/2010/main" w="9525">
                   <a:solidFill>
                     <a:srgbClr val="000000"/>
                   </a:solidFill>
@@ -3029,7 +3029,7 @@
             </a:ln>
             <a:extLst>
               <a:ext uri="{91240B29-F687-4f45-9708-019B960494DF}">
-                <a14:hiddenLine xmlns:a14="http://schemas.microsoft.com/office/drawing/2010/main" xmlns="" w="9525">
+                <a14:hiddenLine xmlns="" xmlns:a14="http://schemas.microsoft.com/office/drawing/2010/main" w="9525">
                   <a:solidFill>
                     <a:srgbClr val="000000"/>
                   </a:solidFill>
@@ -3085,7 +3085,7 @@
             </a:ln>
             <a:extLst>
               <a:ext uri="{91240B29-F687-4f45-9708-019B960494DF}">
-                <a14:hiddenLine xmlns:a14="http://schemas.microsoft.com/office/drawing/2010/main" xmlns="" w="9525">
+                <a14:hiddenLine xmlns="" xmlns:a14="http://schemas.microsoft.com/office/drawing/2010/main" w="9525">
                   <a:solidFill>
                     <a:srgbClr val="000000"/>
                   </a:solidFill>
@@ -3175,7 +3175,7 @@
             </a:ln>
             <a:extLst>
               <a:ext uri="{91240B29-F687-4f45-9708-019B960494DF}">
-                <a14:hiddenLine xmlns:a14="http://schemas.microsoft.com/office/drawing/2010/main" xmlns="" w="9525">
+                <a14:hiddenLine xmlns="" xmlns:a14="http://schemas.microsoft.com/office/drawing/2010/main" w="9525">
                   <a:solidFill>
                     <a:srgbClr val="000000"/>
                   </a:solidFill>
@@ -3243,7 +3243,7 @@
             </a:ln>
             <a:extLst>
               <a:ext uri="{91240B29-F687-4f45-9708-019B960494DF}">
-                <a14:hiddenLine xmlns:a14="http://schemas.microsoft.com/office/drawing/2010/main" xmlns="" w="9525">
+                <a14:hiddenLine xmlns="" xmlns:a14="http://schemas.microsoft.com/office/drawing/2010/main" w="9525">
                   <a:solidFill>
                     <a:srgbClr val="000000"/>
                   </a:solidFill>
@@ -3333,7 +3333,7 @@
             </a:ln>
             <a:extLst>
               <a:ext uri="{91240B29-F687-4f45-9708-019B960494DF}">
-                <a14:hiddenLine xmlns:a14="http://schemas.microsoft.com/office/drawing/2010/main" xmlns="" w="9525">
+                <a14:hiddenLine xmlns="" xmlns:a14="http://schemas.microsoft.com/office/drawing/2010/main" w="9525">
                   <a:solidFill>
                     <a:srgbClr val="000000"/>
                   </a:solidFill>
@@ -3401,7 +3401,7 @@
             </a:ln>
             <a:extLst>
               <a:ext uri="{91240B29-F687-4f45-9708-019B960494DF}">
-                <a14:hiddenLine xmlns:a14="http://schemas.microsoft.com/office/drawing/2010/main" xmlns="" w="9525">
+                <a14:hiddenLine xmlns="" xmlns:a14="http://schemas.microsoft.com/office/drawing/2010/main" w="9525">
                   <a:solidFill>
                     <a:srgbClr val="000000"/>
                   </a:solidFill>
@@ -3491,7 +3491,7 @@
             </a:ln>
             <a:extLst>
               <a:ext uri="{91240B29-F687-4f45-9708-019B960494DF}">
-                <a14:hiddenLine xmlns:a14="http://schemas.microsoft.com/office/drawing/2010/main" xmlns="" w="9525">
+                <a14:hiddenLine xmlns="" xmlns:a14="http://schemas.microsoft.com/office/drawing/2010/main" w="9525">
                   <a:solidFill>
                     <a:srgbClr val="000000"/>
                   </a:solidFill>
@@ -3525,7 +3525,7 @@
             </a:ln>
             <a:extLst>
               <a:ext uri="{91240B29-F687-4f45-9708-019B960494DF}">
-                <a14:hiddenLine xmlns:a14="http://schemas.microsoft.com/office/drawing/2010/main" xmlns="" w="9525">
+                <a14:hiddenLine xmlns="" xmlns:a14="http://schemas.microsoft.com/office/drawing/2010/main" w="9525">
                   <a:solidFill>
                     <a:srgbClr val="000000"/>
                   </a:solidFill>
@@ -3615,7 +3615,7 @@
             </a:ln>
             <a:extLst>
               <a:ext uri="{91240B29-F687-4f45-9708-019B960494DF}">
-                <a14:hiddenLine xmlns:a14="http://schemas.microsoft.com/office/drawing/2010/main" xmlns="" w="9525">
+                <a14:hiddenLine xmlns="" xmlns:a14="http://schemas.microsoft.com/office/drawing/2010/main" w="9525">
                   <a:solidFill>
                     <a:srgbClr val="000000"/>
                   </a:solidFill>
@@ -3677,7 +3677,7 @@
             </a:ln>
             <a:extLst>
               <a:ext uri="{91240B29-F687-4f45-9708-019B960494DF}">
-                <a14:hiddenLine xmlns:a14="http://schemas.microsoft.com/office/drawing/2010/main" xmlns="" w="9525">
+                <a14:hiddenLine xmlns="" xmlns:a14="http://schemas.microsoft.com/office/drawing/2010/main" w="9525">
                   <a:solidFill>
                     <a:srgbClr val="000000"/>
                   </a:solidFill>
@@ -3739,7 +3739,7 @@
             </a:ln>
             <a:extLst>
               <a:ext uri="{91240B29-F687-4f45-9708-019B960494DF}">
-                <a14:hiddenLine xmlns:a14="http://schemas.microsoft.com/office/drawing/2010/main" xmlns="" w="9525">
+                <a14:hiddenLine xmlns="" xmlns:a14="http://schemas.microsoft.com/office/drawing/2010/main" w="9525">
                   <a:solidFill>
                     <a:srgbClr val="000000"/>
                   </a:solidFill>
@@ -3829,7 +3829,7 @@
             </a:ln>
             <a:extLst>
               <a:ext uri="{91240B29-F687-4f45-9708-019B960494DF}">
-                <a14:hiddenLine xmlns:a14="http://schemas.microsoft.com/office/drawing/2010/main" xmlns="" w="9525">
+                <a14:hiddenLine xmlns="" xmlns:a14="http://schemas.microsoft.com/office/drawing/2010/main" w="9525">
                   <a:solidFill>
                     <a:srgbClr val="000000"/>
                   </a:solidFill>
@@ -3897,7 +3897,7 @@
             </a:ln>
             <a:extLst>
               <a:ext uri="{91240B29-F687-4f45-9708-019B960494DF}">
-                <a14:hiddenLine xmlns:a14="http://schemas.microsoft.com/office/drawing/2010/main" xmlns="" w="9525">
+                <a14:hiddenLine xmlns="" xmlns:a14="http://schemas.microsoft.com/office/drawing/2010/main" w="9525">
                   <a:solidFill>
                     <a:srgbClr val="000000"/>
                   </a:solidFill>
@@ -3959,7 +3959,7 @@
             </a:ln>
             <a:extLst>
               <a:ext uri="{91240B29-F687-4f45-9708-019B960494DF}">
-                <a14:hiddenLine xmlns:a14="http://schemas.microsoft.com/office/drawing/2010/main" xmlns="" w="9525">
+                <a14:hiddenLine xmlns="" xmlns:a14="http://schemas.microsoft.com/office/drawing/2010/main" w="9525">
                   <a:solidFill>
                     <a:srgbClr val="000000"/>
                   </a:solidFill>
@@ -4049,7 +4049,7 @@
             </a:ln>
             <a:extLst>
               <a:ext uri="{91240B29-F687-4f45-9708-019B960494DF}">
-                <a14:hiddenLine xmlns:a14="http://schemas.microsoft.com/office/drawing/2010/main" xmlns="" w="9525">
+                <a14:hiddenLine xmlns="" xmlns:a14="http://schemas.microsoft.com/office/drawing/2010/main" w="9525">
                   <a:solidFill>
                     <a:srgbClr val="000000"/>
                   </a:solidFill>
@@ -4111,7 +4111,7 @@
             </a:ln>
             <a:extLst>
               <a:ext uri="{91240B29-F687-4f45-9708-019B960494DF}">
-                <a14:hiddenLine xmlns:a14="http://schemas.microsoft.com/office/drawing/2010/main" xmlns="" w="9525">
+                <a14:hiddenLine xmlns="" xmlns:a14="http://schemas.microsoft.com/office/drawing/2010/main" w="9525">
                   <a:solidFill>
                     <a:srgbClr val="000000"/>
                   </a:solidFill>
@@ -4201,7 +4201,7 @@
             </a:ln>
             <a:extLst>
               <a:ext uri="{91240B29-F687-4f45-9708-019B960494DF}">
-                <a14:hiddenLine xmlns:a14="http://schemas.microsoft.com/office/drawing/2010/main" xmlns="" w="9525">
+                <a14:hiddenLine xmlns="" xmlns:a14="http://schemas.microsoft.com/office/drawing/2010/main" w="9525">
                   <a:solidFill>
                     <a:srgbClr val="000000"/>
                   </a:solidFill>
@@ -4263,7 +4263,7 @@
             </a:ln>
             <a:extLst>
               <a:ext uri="{91240B29-F687-4f45-9708-019B960494DF}">
-                <a14:hiddenLine xmlns:a14="http://schemas.microsoft.com/office/drawing/2010/main" xmlns="" w="9525">
+                <a14:hiddenLine xmlns="" xmlns:a14="http://schemas.microsoft.com/office/drawing/2010/main" w="9525">
                   <a:solidFill>
                     <a:srgbClr val="000000"/>
                   </a:solidFill>
@@ -4353,7 +4353,7 @@
             </a:ln>
             <a:extLst>
               <a:ext uri="{91240B29-F687-4f45-9708-019B960494DF}">
-                <a14:hiddenLine xmlns:a14="http://schemas.microsoft.com/office/drawing/2010/main" xmlns="" w="9525">
+                <a14:hiddenLine xmlns="" xmlns:a14="http://schemas.microsoft.com/office/drawing/2010/main" w="9525">
                   <a:solidFill>
                     <a:srgbClr val="000000"/>
                   </a:solidFill>
@@ -4387,7 +4387,7 @@
             </a:ln>
             <a:extLst>
               <a:ext uri="{91240B29-F687-4f45-9708-019B960494DF}">
-                <a14:hiddenLine xmlns:a14="http://schemas.microsoft.com/office/drawing/2010/main" xmlns="" w="9525">
+                <a14:hiddenLine xmlns="" xmlns:a14="http://schemas.microsoft.com/office/drawing/2010/main" w="9525">
                   <a:solidFill>
                     <a:srgbClr val="000000"/>
                   </a:solidFill>
@@ -4452,7 +4452,7 @@
             </a:ln>
             <a:extLst>
               <a:ext uri="{91240B29-F687-4f45-9708-019B960494DF}">
-                <a14:hiddenLine xmlns:a14="http://schemas.microsoft.com/office/drawing/2010/main" xmlns="" w="9525">
+                <a14:hiddenLine xmlns="" xmlns:a14="http://schemas.microsoft.com/office/drawing/2010/main" w="9525">
                   <a:solidFill>
                     <a:srgbClr val="000000"/>
                   </a:solidFill>
@@ -4542,7 +4542,7 @@
             </a:ln>
             <a:extLst>
               <a:ext uri="{91240B29-F687-4f45-9708-019B960494DF}">
-                <a14:hiddenLine xmlns:a14="http://schemas.microsoft.com/office/drawing/2010/main" xmlns="" w="9525">
+                <a14:hiddenLine xmlns="" xmlns:a14="http://schemas.microsoft.com/office/drawing/2010/main" w="9525">
                   <a:solidFill>
                     <a:srgbClr val="000000"/>
                   </a:solidFill>
@@ -4604,7 +4604,7 @@
             </a:ln>
             <a:extLst>
               <a:ext uri="{91240B29-F687-4f45-9708-019B960494DF}">
-                <a14:hiddenLine xmlns:a14="http://schemas.microsoft.com/office/drawing/2010/main" xmlns="" w="9525">
+                <a14:hiddenLine xmlns="" xmlns:a14="http://schemas.microsoft.com/office/drawing/2010/main" w="9525">
                   <a:solidFill>
                     <a:srgbClr val="000000"/>
                   </a:solidFill>
@@ -4694,7 +4694,7 @@
             </a:ln>
             <a:extLst>
               <a:ext uri="{91240B29-F687-4f45-9708-019B960494DF}">
-                <a14:hiddenLine xmlns:a14="http://schemas.microsoft.com/office/drawing/2010/main" xmlns="" w="9525">
+                <a14:hiddenLine xmlns="" xmlns:a14="http://schemas.microsoft.com/office/drawing/2010/main" w="9525">
                   <a:solidFill>
                     <a:srgbClr val="000000"/>
                   </a:solidFill>
@@ -4784,7 +4784,7 @@
             </a:ln>
             <a:extLst>
               <a:ext uri="{91240B29-F687-4f45-9708-019B960494DF}">
-                <a14:hiddenLine xmlns:a14="http://schemas.microsoft.com/office/drawing/2010/main" xmlns="" w="9525">
+                <a14:hiddenLine xmlns="" xmlns:a14="http://schemas.microsoft.com/office/drawing/2010/main" w="9525">
                   <a:solidFill>
                     <a:srgbClr val="000000"/>
                   </a:solidFill>
@@ -4849,7 +4849,7 @@
             </a:ln>
             <a:extLst>
               <a:ext uri="{91240B29-F687-4f45-9708-019B960494DF}">
-                <a14:hiddenLine xmlns:a14="http://schemas.microsoft.com/office/drawing/2010/main" xmlns="" w="9525">
+                <a14:hiddenLine xmlns="" xmlns:a14="http://schemas.microsoft.com/office/drawing/2010/main" w="9525">
                   <a:solidFill>
                     <a:srgbClr val="000000"/>
                   </a:solidFill>
@@ -4911,7 +4911,7 @@
             </a:ln>
             <a:extLst>
               <a:ext uri="{91240B29-F687-4f45-9708-019B960494DF}">
-                <a14:hiddenLine xmlns:a14="http://schemas.microsoft.com/office/drawing/2010/main" xmlns="" w="9525">
+                <a14:hiddenLine xmlns="" xmlns:a14="http://schemas.microsoft.com/office/drawing/2010/main" w="9525">
                   <a:solidFill>
                     <a:srgbClr val="000000"/>
                   </a:solidFill>
@@ -5001,7 +5001,7 @@
             </a:ln>
             <a:extLst>
               <a:ext uri="{91240B29-F687-4f45-9708-019B960494DF}">
-                <a14:hiddenLine xmlns:a14="http://schemas.microsoft.com/office/drawing/2010/main" xmlns="" w="9525">
+                <a14:hiddenLine xmlns="" xmlns:a14="http://schemas.microsoft.com/office/drawing/2010/main" w="9525">
                   <a:solidFill>
                     <a:srgbClr val="000000"/>
                   </a:solidFill>
@@ -5091,7 +5091,7 @@
             </a:ln>
             <a:extLst>
               <a:ext uri="{91240B29-F687-4f45-9708-019B960494DF}">
-                <a14:hiddenLine xmlns:a14="http://schemas.microsoft.com/office/drawing/2010/main" xmlns="" w="9525">
+                <a14:hiddenLine xmlns="" xmlns:a14="http://schemas.microsoft.com/office/drawing/2010/main" w="9525">
                   <a:solidFill>
                     <a:srgbClr val="000000"/>
                   </a:solidFill>
@@ -5153,7 +5153,7 @@
             </a:ln>
             <a:extLst>
               <a:ext uri="{91240B29-F687-4f45-9708-019B960494DF}">
-                <a14:hiddenLine xmlns:a14="http://schemas.microsoft.com/office/drawing/2010/main" xmlns="" w="9525">
+                <a14:hiddenLine xmlns="" xmlns:a14="http://schemas.microsoft.com/office/drawing/2010/main" w="9525">
                   <a:solidFill>
                     <a:srgbClr val="000000"/>
                   </a:solidFill>
@@ -5273,7 +5273,7 @@
             </a:ln>
             <a:extLst>
               <a:ext uri="{91240B29-F687-4f45-9708-019B960494DF}">
-                <a14:hiddenLine xmlns:a14="http://schemas.microsoft.com/office/drawing/2010/main" xmlns="" w="9525">
+                <a14:hiddenLine xmlns="" xmlns:a14="http://schemas.microsoft.com/office/drawing/2010/main" w="9525">
                   <a:solidFill>
                     <a:srgbClr val="000000"/>
                   </a:solidFill>
@@ -5341,7 +5341,7 @@
             </a:ln>
             <a:extLst>
               <a:ext uri="{91240B29-F687-4f45-9708-019B960494DF}">
-                <a14:hiddenLine xmlns:a14="http://schemas.microsoft.com/office/drawing/2010/main" xmlns="" w="9525">
+                <a14:hiddenLine xmlns="" xmlns:a14="http://schemas.microsoft.com/office/drawing/2010/main" w="9525">
                   <a:solidFill>
                     <a:srgbClr val="000000"/>
                   </a:solidFill>
@@ -5431,7 +5431,7 @@
             </a:ln>
             <a:extLst>
               <a:ext uri="{91240B29-F687-4f45-9708-019B960494DF}">
-                <a14:hiddenLine xmlns:a14="http://schemas.microsoft.com/office/drawing/2010/main" xmlns="" w="9525">
+                <a14:hiddenLine xmlns="" xmlns:a14="http://schemas.microsoft.com/office/drawing/2010/main" w="9525">
                   <a:solidFill>
                     <a:srgbClr val="000000"/>
                   </a:solidFill>
@@ -10306,7 +10306,7 @@
           <a:noFill/>
           <a:extLst>
             <a:ext uri="{909E8E84-426E-40dd-AFC4-6F175D3DCCD1}">
-              <a14:hiddenFill xmlns:a14="http://schemas.microsoft.com/office/drawing/2010/main" xmlns="">
+              <a14:hiddenFill xmlns="" xmlns:a14="http://schemas.microsoft.com/office/drawing/2010/main">
                 <a:solidFill>
                   <a:srgbClr val="FFFFFF"/>
                 </a:solidFill>
@@ -10380,7 +10380,7 @@
               </a:ln>
               <a:extLst>
                 <a:ext uri="{91240B29-F687-4f45-9708-019B960494DF}">
-                  <a14:hiddenLine xmlns:a14="http://schemas.microsoft.com/office/drawing/2010/main" xmlns="" w="9525">
+                  <a14:hiddenLine xmlns="" xmlns:a14="http://schemas.microsoft.com/office/drawing/2010/main" w="9525">
                     <a:solidFill>
                       <a:srgbClr val="000000"/>
                     </a:solidFill>
@@ -10470,7 +10470,7 @@
               </a:ln>
               <a:extLst>
                 <a:ext uri="{91240B29-F687-4f45-9708-019B960494DF}">
-                  <a14:hiddenLine xmlns:a14="http://schemas.microsoft.com/office/drawing/2010/main" xmlns="" w="9525">
+                  <a14:hiddenLine xmlns="" xmlns:a14="http://schemas.microsoft.com/office/drawing/2010/main" w="9525">
                     <a:solidFill>
                       <a:srgbClr val="000000"/>
                     </a:solidFill>
@@ -10560,7 +10560,7 @@
               </a:ln>
               <a:extLst>
                 <a:ext uri="{91240B29-F687-4f45-9708-019B960494DF}">
-                  <a14:hiddenLine xmlns:a14="http://schemas.microsoft.com/office/drawing/2010/main" xmlns="" w="9525">
+                  <a14:hiddenLine xmlns="" xmlns:a14="http://schemas.microsoft.com/office/drawing/2010/main" w="9525">
                     <a:solidFill>
                       <a:srgbClr val="000000"/>
                     </a:solidFill>
@@ -10622,7 +10622,7 @@
               </a:ln>
               <a:extLst>
                 <a:ext uri="{91240B29-F687-4f45-9708-019B960494DF}">
-                  <a14:hiddenLine xmlns:a14="http://schemas.microsoft.com/office/drawing/2010/main" xmlns="" w="9525">
+                  <a14:hiddenLine xmlns="" xmlns:a14="http://schemas.microsoft.com/office/drawing/2010/main" w="9525">
                     <a:solidFill>
                       <a:srgbClr val="000000"/>
                     </a:solidFill>
@@ -10712,7 +10712,7 @@
               </a:ln>
               <a:extLst>
                 <a:ext uri="{91240B29-F687-4f45-9708-019B960494DF}">
-                  <a14:hiddenLine xmlns:a14="http://schemas.microsoft.com/office/drawing/2010/main" xmlns="" w="9525">
+                  <a14:hiddenLine xmlns="" xmlns:a14="http://schemas.microsoft.com/office/drawing/2010/main" w="9525">
                     <a:solidFill>
                       <a:srgbClr val="000000"/>
                     </a:solidFill>
@@ -10774,7 +10774,7 @@
               </a:ln>
               <a:extLst>
                 <a:ext uri="{91240B29-F687-4f45-9708-019B960494DF}">
-                  <a14:hiddenLine xmlns:a14="http://schemas.microsoft.com/office/drawing/2010/main" xmlns="" w="9525">
+                  <a14:hiddenLine xmlns="" xmlns:a14="http://schemas.microsoft.com/office/drawing/2010/main" w="9525">
                     <a:solidFill>
                       <a:srgbClr val="000000"/>
                     </a:solidFill>
@@ -10836,7 +10836,7 @@
               </a:ln>
               <a:extLst>
                 <a:ext uri="{91240B29-F687-4f45-9708-019B960494DF}">
-                  <a14:hiddenLine xmlns:a14="http://schemas.microsoft.com/office/drawing/2010/main" xmlns="" w="9525">
+                  <a14:hiddenLine xmlns="" xmlns:a14="http://schemas.microsoft.com/office/drawing/2010/main" w="9525">
                     <a:solidFill>
                       <a:srgbClr val="000000"/>
                     </a:solidFill>
@@ -10926,7 +10926,7 @@
               </a:ln>
               <a:extLst>
                 <a:ext uri="{91240B29-F687-4f45-9708-019B960494DF}">
-                  <a14:hiddenLine xmlns:a14="http://schemas.microsoft.com/office/drawing/2010/main" xmlns="" w="9525">
+                  <a14:hiddenLine xmlns="" xmlns:a14="http://schemas.microsoft.com/office/drawing/2010/main" w="9525">
                     <a:solidFill>
                       <a:srgbClr val="000000"/>
                     </a:solidFill>
@@ -11016,7 +11016,7 @@
               </a:ln>
               <a:extLst>
                 <a:ext uri="{91240B29-F687-4f45-9708-019B960494DF}">
-                  <a14:hiddenLine xmlns:a14="http://schemas.microsoft.com/office/drawing/2010/main" xmlns="" w="9525">
+                  <a14:hiddenLine xmlns="" xmlns:a14="http://schemas.microsoft.com/office/drawing/2010/main" w="9525">
                     <a:solidFill>
                       <a:srgbClr val="000000"/>
                     </a:solidFill>
@@ -11078,7 +11078,7 @@
               </a:ln>
               <a:extLst>
                 <a:ext uri="{91240B29-F687-4f45-9708-019B960494DF}">
-                  <a14:hiddenLine xmlns:a14="http://schemas.microsoft.com/office/drawing/2010/main" xmlns="" w="9525">
+                  <a14:hiddenLine xmlns="" xmlns:a14="http://schemas.microsoft.com/office/drawing/2010/main" w="9525">
                     <a:solidFill>
                       <a:srgbClr val="000000"/>
                     </a:solidFill>
@@ -11188,7 +11188,7 @@
               </a:ln>
               <a:extLst>
                 <a:ext uri="{91240B29-F687-4f45-9708-019B960494DF}">
-                  <a14:hiddenLine xmlns:a14="http://schemas.microsoft.com/office/drawing/2010/main" xmlns="" w="9525">
+                  <a14:hiddenLine xmlns="" xmlns:a14="http://schemas.microsoft.com/office/drawing/2010/main" w="9525">
                     <a:solidFill>
                       <a:srgbClr val="000000"/>
                     </a:solidFill>
@@ -11272,7 +11272,7 @@
               </a:ln>
               <a:extLst>
                 <a:ext uri="{91240B29-F687-4f45-9708-019B960494DF}">
-                  <a14:hiddenLine xmlns:a14="http://schemas.microsoft.com/office/drawing/2010/main" xmlns="" w="9525">
+                  <a14:hiddenLine xmlns="" xmlns:a14="http://schemas.microsoft.com/office/drawing/2010/main" w="9525">
                     <a:solidFill>
                       <a:srgbClr val="000000"/>
                     </a:solidFill>
@@ -11334,7 +11334,7 @@
               </a:ln>
               <a:extLst>
                 <a:ext uri="{91240B29-F687-4f45-9708-019B960494DF}">
-                  <a14:hiddenLine xmlns:a14="http://schemas.microsoft.com/office/drawing/2010/main" xmlns="" w="9525">
+                  <a14:hiddenLine xmlns="" xmlns:a14="http://schemas.microsoft.com/office/drawing/2010/main" w="9525">
                     <a:solidFill>
                       <a:srgbClr val="000000"/>
                     </a:solidFill>
@@ -11396,7 +11396,7 @@
               </a:ln>
               <a:extLst>
                 <a:ext uri="{91240B29-F687-4f45-9708-019B960494DF}">
-                  <a14:hiddenLine xmlns:a14="http://schemas.microsoft.com/office/drawing/2010/main" xmlns="" w="9525">
+                  <a14:hiddenLine xmlns="" xmlns:a14="http://schemas.microsoft.com/office/drawing/2010/main" w="9525">
                     <a:solidFill>
                       <a:srgbClr val="000000"/>
                     </a:solidFill>
@@ -11486,7 +11486,7 @@
               </a:ln>
               <a:extLst>
                 <a:ext uri="{91240B29-F687-4f45-9708-019B960494DF}">
-                  <a14:hiddenLine xmlns:a14="http://schemas.microsoft.com/office/drawing/2010/main" xmlns="" w="9525">
+                  <a14:hiddenLine xmlns="" xmlns:a14="http://schemas.microsoft.com/office/drawing/2010/main" w="9525">
                     <a:solidFill>
                       <a:srgbClr val="000000"/>
                     </a:solidFill>
@@ -11520,7 +11520,7 @@
               </a:ln>
               <a:extLst>
                 <a:ext uri="{91240B29-F687-4f45-9708-019B960494DF}">
-                  <a14:hiddenLine xmlns:a14="http://schemas.microsoft.com/office/drawing/2010/main" xmlns="" w="9525">
+                  <a14:hiddenLine xmlns="" xmlns:a14="http://schemas.microsoft.com/office/drawing/2010/main" w="9525">
                     <a:solidFill>
                       <a:srgbClr val="000000"/>
                     </a:solidFill>
@@ -11585,7 +11585,7 @@
               </a:ln>
               <a:extLst>
                 <a:ext uri="{91240B29-F687-4f45-9708-019B960494DF}">
-                  <a14:hiddenLine xmlns:a14="http://schemas.microsoft.com/office/drawing/2010/main" xmlns="" w="9525">
+                  <a14:hiddenLine xmlns="" xmlns:a14="http://schemas.microsoft.com/office/drawing/2010/main" w="9525">
                     <a:solidFill>
                       <a:srgbClr val="000000"/>
                     </a:solidFill>
@@ -11675,7 +11675,7 @@
               </a:ln>
               <a:extLst>
                 <a:ext uri="{91240B29-F687-4f45-9708-019B960494DF}">
-                  <a14:hiddenLine xmlns:a14="http://schemas.microsoft.com/office/drawing/2010/main" xmlns="" w="9525">
+                  <a14:hiddenLine xmlns="" xmlns:a14="http://schemas.microsoft.com/office/drawing/2010/main" w="9525">
                     <a:solidFill>
                       <a:srgbClr val="000000"/>
                     </a:solidFill>
@@ -11737,7 +11737,7 @@
               </a:ln>
               <a:extLst>
                 <a:ext uri="{91240B29-F687-4f45-9708-019B960494DF}">
-                  <a14:hiddenLine xmlns:a14="http://schemas.microsoft.com/office/drawing/2010/main" xmlns="" w="9525">
+                  <a14:hiddenLine xmlns="" xmlns:a14="http://schemas.microsoft.com/office/drawing/2010/main" w="9525">
                     <a:solidFill>
                       <a:srgbClr val="000000"/>
                     </a:solidFill>
@@ -11827,7 +11827,7 @@
               </a:ln>
               <a:extLst>
                 <a:ext uri="{91240B29-F687-4f45-9708-019B960494DF}">
-                  <a14:hiddenLine xmlns:a14="http://schemas.microsoft.com/office/drawing/2010/main" xmlns="" w="9525">
+                  <a14:hiddenLine xmlns="" xmlns:a14="http://schemas.microsoft.com/office/drawing/2010/main" w="9525">
                     <a:solidFill>
                       <a:srgbClr val="000000"/>
                     </a:solidFill>
@@ -11892,7 +11892,7 @@
               </a:ln>
               <a:extLst>
                 <a:ext uri="{91240B29-F687-4f45-9708-019B960494DF}">
-                  <a14:hiddenLine xmlns:a14="http://schemas.microsoft.com/office/drawing/2010/main" xmlns="" w="9525">
+                  <a14:hiddenLine xmlns="" xmlns:a14="http://schemas.microsoft.com/office/drawing/2010/main" w="9525">
                     <a:solidFill>
                       <a:srgbClr val="000000"/>
                     </a:solidFill>
@@ -11954,7 +11954,7 @@
               </a:ln>
               <a:extLst>
                 <a:ext uri="{91240B29-F687-4f45-9708-019B960494DF}">
-                  <a14:hiddenLine xmlns:a14="http://schemas.microsoft.com/office/drawing/2010/main" xmlns="" w="9525">
+                  <a14:hiddenLine xmlns="" xmlns:a14="http://schemas.microsoft.com/office/drawing/2010/main" w="9525">
                     <a:solidFill>
                       <a:srgbClr val="000000"/>
                     </a:solidFill>
@@ -12044,7 +12044,7 @@
               </a:ln>
               <a:extLst>
                 <a:ext uri="{91240B29-F687-4f45-9708-019B960494DF}">
-                  <a14:hiddenLine xmlns:a14="http://schemas.microsoft.com/office/drawing/2010/main" xmlns="" w="9525">
+                  <a14:hiddenLine xmlns="" xmlns:a14="http://schemas.microsoft.com/office/drawing/2010/main" w="9525">
                     <a:solidFill>
                       <a:srgbClr val="000000"/>
                     </a:solidFill>
@@ -12134,7 +12134,7 @@
               </a:ln>
               <a:extLst>
                 <a:ext uri="{91240B29-F687-4f45-9708-019B960494DF}">
-                  <a14:hiddenLine xmlns:a14="http://schemas.microsoft.com/office/drawing/2010/main" xmlns="" w="9525">
+                  <a14:hiddenLine xmlns="" xmlns:a14="http://schemas.microsoft.com/office/drawing/2010/main" w="9525">
                     <a:solidFill>
                       <a:srgbClr val="000000"/>
                     </a:solidFill>
@@ -12199,7 +12199,7 @@
               </a:ln>
               <a:extLst>
                 <a:ext uri="{91240B29-F687-4f45-9708-019B960494DF}">
-                  <a14:hiddenLine xmlns:a14="http://schemas.microsoft.com/office/drawing/2010/main" xmlns="" w="9525">
+                  <a14:hiddenLine xmlns="" xmlns:a14="http://schemas.microsoft.com/office/drawing/2010/main" w="9525">
                     <a:solidFill>
                       <a:srgbClr val="000000"/>
                     </a:solidFill>
@@ -12319,7 +12319,7 @@
               </a:ln>
               <a:extLst>
                 <a:ext uri="{91240B29-F687-4f45-9708-019B960494DF}">
-                  <a14:hiddenLine xmlns:a14="http://schemas.microsoft.com/office/drawing/2010/main" xmlns="" w="9525">
+                  <a14:hiddenLine xmlns="" xmlns:a14="http://schemas.microsoft.com/office/drawing/2010/main" w="9525">
                     <a:solidFill>
                       <a:srgbClr val="000000"/>
                     </a:solidFill>
@@ -12417,7 +12417,7 @@
               </a:ln>
               <a:extLst>
                 <a:ext uri="{91240B29-F687-4f45-9708-019B960494DF}">
-                  <a14:hiddenLine xmlns:a14="http://schemas.microsoft.com/office/drawing/2010/main" xmlns="" w="9525">
+                  <a14:hiddenLine xmlns="" xmlns:a14="http://schemas.microsoft.com/office/drawing/2010/main" w="9525">
                     <a:solidFill>
                       <a:srgbClr val="000000"/>
                     </a:solidFill>
@@ -12532,7 +12532,7 @@
               </a:ln>
               <a:extLst>
                 <a:ext uri="{91240B29-F687-4f45-9708-019B960494DF}">
-                  <a14:hiddenLine xmlns:a14="http://schemas.microsoft.com/office/drawing/2010/main" xmlns="" w="9525">
+                  <a14:hiddenLine xmlns="" xmlns:a14="http://schemas.microsoft.com/office/drawing/2010/main" w="9525">
                     <a:solidFill>
                       <a:srgbClr val="000000"/>
                     </a:solidFill>
@@ -12622,7 +12622,7 @@
               </a:ln>
               <a:extLst>
                 <a:ext uri="{91240B29-F687-4f45-9708-019B960494DF}">
-                  <a14:hiddenLine xmlns:a14="http://schemas.microsoft.com/office/drawing/2010/main" xmlns="" w="9525">
+                  <a14:hiddenLine xmlns="" xmlns:a14="http://schemas.microsoft.com/office/drawing/2010/main" w="9525">
                     <a:solidFill>
                       <a:srgbClr val="000000"/>
                     </a:solidFill>
@@ -12687,7 +12687,7 @@
               </a:ln>
               <a:extLst>
                 <a:ext uri="{91240B29-F687-4f45-9708-019B960494DF}">
-                  <a14:hiddenLine xmlns:a14="http://schemas.microsoft.com/office/drawing/2010/main" xmlns="" w="9525">
+                  <a14:hiddenLine xmlns="" xmlns:a14="http://schemas.microsoft.com/office/drawing/2010/main" w="9525">
                     <a:solidFill>
                       <a:srgbClr val="000000"/>
                     </a:solidFill>
@@ -12777,7 +12777,7 @@
               </a:ln>
               <a:extLst>
                 <a:ext uri="{91240B29-F687-4f45-9708-019B960494DF}">
-                  <a14:hiddenLine xmlns:a14="http://schemas.microsoft.com/office/drawing/2010/main" xmlns="" w="9525">
+                  <a14:hiddenLine xmlns="" xmlns:a14="http://schemas.microsoft.com/office/drawing/2010/main" w="9525">
                     <a:solidFill>
                       <a:srgbClr val="000000"/>
                     </a:solidFill>
@@ -12845,7 +12845,7 @@
               </a:ln>
               <a:extLst>
                 <a:ext uri="{91240B29-F687-4f45-9708-019B960494DF}">
-                  <a14:hiddenLine xmlns:a14="http://schemas.microsoft.com/office/drawing/2010/main" xmlns="" w="9525">
+                  <a14:hiddenLine xmlns="" xmlns:a14="http://schemas.microsoft.com/office/drawing/2010/main" w="9525">
                     <a:solidFill>
                       <a:srgbClr val="000000"/>
                     </a:solidFill>
@@ -12935,7 +12935,7 @@
               </a:ln>
               <a:extLst>
                 <a:ext uri="{91240B29-F687-4f45-9708-019B960494DF}">
-                  <a14:hiddenLine xmlns:a14="http://schemas.microsoft.com/office/drawing/2010/main" xmlns="" w="9525">
+                  <a14:hiddenLine xmlns="" xmlns:a14="http://schemas.microsoft.com/office/drawing/2010/main" w="9525">
                     <a:solidFill>
                       <a:srgbClr val="000000"/>
                     </a:solidFill>
@@ -13003,7 +13003,7 @@
               </a:ln>
               <a:extLst>
                 <a:ext uri="{91240B29-F687-4f45-9708-019B960494DF}">
-                  <a14:hiddenLine xmlns:a14="http://schemas.microsoft.com/office/drawing/2010/main" xmlns="" w="9525">
+                  <a14:hiddenLine xmlns="" xmlns:a14="http://schemas.microsoft.com/office/drawing/2010/main" w="9525">
                     <a:solidFill>
                       <a:srgbClr val="000000"/>
                     </a:solidFill>
@@ -13093,7 +13093,7 @@
               </a:ln>
               <a:extLst>
                 <a:ext uri="{91240B29-F687-4f45-9708-019B960494DF}">
-                  <a14:hiddenLine xmlns:a14="http://schemas.microsoft.com/office/drawing/2010/main" xmlns="" w="9525">
+                  <a14:hiddenLine xmlns="" xmlns:a14="http://schemas.microsoft.com/office/drawing/2010/main" w="9525">
                     <a:solidFill>
                       <a:srgbClr val="000000"/>
                     </a:solidFill>
@@ -13127,7 +13127,7 @@
               </a:ln>
               <a:extLst>
                 <a:ext uri="{91240B29-F687-4f45-9708-019B960494DF}">
-                  <a14:hiddenLine xmlns:a14="http://schemas.microsoft.com/office/drawing/2010/main" xmlns="" w="9525">
+                  <a14:hiddenLine xmlns="" xmlns:a14="http://schemas.microsoft.com/office/drawing/2010/main" w="9525">
                     <a:solidFill>
                       <a:srgbClr val="000000"/>
                     </a:solidFill>
@@ -13942,7 +13942,7 @@
           <p:nvPr/>
         </p:nvPicPr>
         <p:blipFill>
-          <a:blip r:embed="rId3">
+          <a:blip r:embed="rId3" cstate="hqprint">
             <a:extLst>
               <a:ext uri="{28A0092B-C50C-407E-A947-70E740481C1C}">
                 <a14:useLocalDpi xmlns:a14="http://schemas.microsoft.com/office/drawing/2010/main" val="0"/>
@@ -13988,8 +13988,8 @@
         </p:nvSpPr>
         <p:spPr>
           <a:xfrm>
-            <a:off x="5252355" y="2403640"/>
-            <a:ext cx="1943102" cy="461665"/>
+            <a:off x="4994412" y="2454969"/>
+            <a:ext cx="2835569" cy="461665"/>
           </a:xfrm>
           <a:prstGeom prst="rect">
             <a:avLst/>
@@ -14003,13 +14003,14 @@
           <a:lstStyle/>
           <a:p>
             <a:r>
-              <a:rPr lang="fr-FR" sz="2400" dirty="0" err="1"/>
+              <a:rPr lang="fr-FR" sz="2400" dirty="0" err="1" smtClean="0"/>
               <a:t>Bontron</a:t>
             </a:r>
             <a:r>
-              <a:rPr lang="fr-FR" sz="2400" dirty="0"/>
+              <a:rPr lang="fr-FR" sz="2400" dirty="0" smtClean="0"/>
               <a:t> Julien</a:t>
             </a:r>
+            <a:endParaRPr lang="fr-FR" sz="2400" dirty="0"/>
           </a:p>
         </p:txBody>
       </p:sp>
@@ -14337,6 +14338,17 @@
               <a:buNone/>
             </a:pPr>
             <a:r>
+              <a:rPr lang="fr-FR" dirty="0" smtClean="0">
+                <a:solidFill>
+                  <a:schemeClr val="accent1">
+                    <a:lumMod val="60000"/>
+                    <a:lumOff val="40000"/>
+                  </a:schemeClr>
+                </a:solidFill>
+              </a:rPr>
+              <a:t>+ supporte </a:t>
+            </a:r>
+            <a:r>
               <a:rPr lang="fr-FR" dirty="0">
                 <a:solidFill>
                   <a:schemeClr val="accent1">
@@ -14345,13 +14357,19 @@
                   </a:schemeClr>
                 </a:solidFill>
               </a:rPr>
-              <a:t>+supporte plus d’un douzaine de langage</a:t>
-            </a:r>
-          </a:p>
-          <a:p>
-            <a:pPr marL="457200" lvl="1" indent="0">
-              <a:buNone/>
-            </a:pPr>
+              <a:t>plus </a:t>
+            </a:r>
+            <a:r>
+              <a:rPr lang="fr-FR" dirty="0" smtClean="0">
+                <a:solidFill>
+                  <a:schemeClr val="accent1">
+                    <a:lumMod val="60000"/>
+                    <a:lumOff val="40000"/>
+                  </a:schemeClr>
+                </a:solidFill>
+              </a:rPr>
+              <a:t>d’une </a:t>
+            </a:r>
             <a:r>
               <a:rPr lang="fr-FR" dirty="0">
                 <a:solidFill>
@@ -14361,7 +14379,34 @@
                   </a:schemeClr>
                 </a:solidFill>
               </a:rPr>
-              <a:t>+large communauté </a:t>
+              <a:t>douzaine de langage</a:t>
+            </a:r>
+          </a:p>
+          <a:p>
+            <a:pPr marL="457200" lvl="1" indent="0">
+              <a:buNone/>
+            </a:pPr>
+            <a:r>
+              <a:rPr lang="fr-FR" dirty="0" smtClean="0">
+                <a:solidFill>
+                  <a:schemeClr val="accent1">
+                    <a:lumMod val="60000"/>
+                    <a:lumOff val="40000"/>
+                  </a:schemeClr>
+                </a:solidFill>
+              </a:rPr>
+              <a:t>+ large </a:t>
+            </a:r>
+            <a:r>
+              <a:rPr lang="fr-FR" dirty="0">
+                <a:solidFill>
+                  <a:schemeClr val="accent1">
+                    <a:lumMod val="60000"/>
+                    <a:lumOff val="40000"/>
+                  </a:schemeClr>
+                </a:solidFill>
+              </a:rPr>
+              <a:t>communauté </a:t>
             </a:r>
           </a:p>
           <a:p>
@@ -14463,7 +14508,51 @@
                   </a:schemeClr>
                 </a:solidFill>
               </a:rPr>
-              <a:t>	+ supporte de nombreux VCS (git, 	SVN, Mercurial)</a:t>
+              <a:t>	+ supporte de nombreux VCS </a:t>
+            </a:r>
+            <a:r>
+              <a:rPr lang="fr-FR" dirty="0" smtClean="0">
+                <a:solidFill>
+                  <a:schemeClr val="accent2">
+                    <a:lumMod val="40000"/>
+                    <a:lumOff val="60000"/>
+                  </a:schemeClr>
+                </a:solidFill>
+              </a:rPr>
+              <a:t>	(git</a:t>
+            </a:r>
+            <a:r>
+              <a:rPr lang="fr-FR" dirty="0">
+                <a:solidFill>
+                  <a:schemeClr val="accent2">
+                    <a:lumMod val="40000"/>
+                    <a:lumOff val="60000"/>
+                  </a:schemeClr>
+                </a:solidFill>
+              </a:rPr>
+              <a:t>, </a:t>
+            </a:r>
+            <a:r>
+              <a:rPr lang="fr-FR" dirty="0" smtClean="0">
+                <a:solidFill>
+                  <a:schemeClr val="accent2">
+                    <a:lumMod val="40000"/>
+                    <a:lumOff val="60000"/>
+                  </a:schemeClr>
+                </a:solidFill>
+              </a:rPr>
+              <a:t>SVN</a:t>
+            </a:r>
+            <a:r>
+              <a:rPr lang="fr-FR" dirty="0">
+                <a:solidFill>
+                  <a:schemeClr val="accent2">
+                    <a:lumMod val="40000"/>
+                    <a:lumOff val="60000"/>
+                  </a:schemeClr>
+                </a:solidFill>
+              </a:rPr>
+              <a:t>, Mercurial)</a:t>
             </a:r>
           </a:p>
           <a:p>
@@ -14828,8 +14917,12 @@
           </a:p>
           <a:p>
             <a:r>
+              <a:rPr lang="fr-FR" dirty="0" smtClean="0"/>
+              <a:t>Rapprocher </a:t>
+            </a:r>
+            <a:r>
               <a:rPr lang="fr-FR" dirty="0"/>
-              <a:t>Rapproché ce projet du cours sur Docker que nous avions eu en début de semestre </a:t>
+              <a:t>ce projet du cours sur Docker que nous avions eu en début de semestre </a:t>
             </a:r>
           </a:p>
           <a:p>
@@ -15017,13 +15110,18 @@
             <p:ph type="ftr" sz="quarter" idx="11"/>
           </p:nvPr>
         </p:nvSpPr>
-        <p:spPr/>
+        <p:spPr>
+          <a:xfrm>
+            <a:off x="1117661" y="5984787"/>
+            <a:ext cx="6239309" cy="365125"/>
+          </a:xfrm>
+        </p:spPr>
         <p:txBody>
           <a:bodyPr/>
           <a:lstStyle/>
           <a:p>
             <a:r>
-              <a:rPr lang="fr-FR"/>
+              <a:rPr lang="fr-FR" dirty="0"/>
               <a:t>29/11/2017</a:t>
             </a:r>
           </a:p>
@@ -15045,7 +15143,12 @@
             <p:ph type="sldNum" sz="quarter" idx="12"/>
           </p:nvPr>
         </p:nvSpPr>
-        <p:spPr/>
+        <p:spPr>
+          <a:xfrm>
+            <a:off x="10383199" y="5984787"/>
+            <a:ext cx="771089" cy="365125"/>
+          </a:xfrm>
+        </p:spPr>
         <p:txBody>
           <a:bodyPr/>
           <a:lstStyle/>
@@ -15055,7 +15158,7 @@
               <a:pPr/>
               <a:t>13</a:t>
             </a:fld>
-            <a:endParaRPr lang="fr-FR"/>
+            <a:endParaRPr lang="fr-FR" dirty="0"/>
           </a:p>
         </p:txBody>
       </p:sp>
@@ -15669,8 +15772,27 @@
                   </a:schemeClr>
                 </a:solidFill>
               </a:rPr>
-              <a:t>- Manque de robustesse avec de forte volumétrie </a:t>
-            </a:r>
+              <a:t>- Manque de robustesse avec de </a:t>
+            </a:r>
+            <a:r>
+              <a:rPr lang="fr-FR" dirty="0" smtClean="0">
+                <a:solidFill>
+                  <a:schemeClr val="accent2">
+                    <a:lumMod val="40000"/>
+                    <a:lumOff val="60000"/>
+                  </a:schemeClr>
+                </a:solidFill>
+              </a:rPr>
+              <a:t>fortes volumétries </a:t>
+            </a:r>
+            <a:endParaRPr lang="fr-FR" dirty="0">
+              <a:solidFill>
+                <a:schemeClr val="accent2">
+                  <a:lumMod val="40000"/>
+                  <a:lumOff val="60000"/>
+                </a:schemeClr>
+              </a:solidFill>
+            </a:endParaRPr>
           </a:p>
           <a:p>
             <a:r>
@@ -15744,7 +15866,29 @@
                   </a:schemeClr>
                 </a:solidFill>
               </a:rPr>
-              <a:t>+ Non relationnel de base mais peu le devenir</a:t>
+              <a:t>+ Non relationnel de base mais </a:t>
+            </a:r>
+            <a:r>
+              <a:rPr lang="fr-FR" dirty="0" smtClean="0">
+                <a:solidFill>
+                  <a:schemeClr val="accent1">
+                    <a:lumMod val="60000"/>
+                    <a:lumOff val="40000"/>
+                  </a:schemeClr>
+                </a:solidFill>
+              </a:rPr>
+              <a:t>peut </a:t>
+            </a:r>
+            <a:r>
+              <a:rPr lang="fr-FR" dirty="0">
+                <a:solidFill>
+                  <a:schemeClr val="accent1">
+                    <a:lumMod val="60000"/>
+                    <a:lumOff val="40000"/>
+                  </a:schemeClr>
+                </a:solidFill>
+              </a:rPr>
+              <a:t>le devenir</a:t>
             </a:r>
           </a:p>
           <a:p>
@@ -15842,8 +15986,27 @@
                   </a:schemeClr>
                 </a:solidFill>
               </a:rPr>
-              <a:t>- Manque de robustesse avec de forte volumétrie</a:t>
-            </a:r>
+              <a:t>- Manque de robustesse avec de </a:t>
+            </a:r>
+            <a:r>
+              <a:rPr lang="fr-FR" dirty="0" smtClean="0">
+                <a:solidFill>
+                  <a:schemeClr val="accent2">
+                    <a:lumMod val="40000"/>
+                    <a:lumOff val="60000"/>
+                  </a:schemeClr>
+                </a:solidFill>
+              </a:rPr>
+              <a:t>fortes volumétries</a:t>
+            </a:r>
+            <a:endParaRPr lang="fr-FR" dirty="0">
+              <a:solidFill>
+                <a:schemeClr val="accent2">
+                  <a:lumMod val="40000"/>
+                  <a:lumOff val="60000"/>
+                </a:schemeClr>
+              </a:solidFill>
+            </a:endParaRPr>
           </a:p>
           <a:p>
             <a:pPr lvl="0"/>
@@ -15910,7 +16073,29 @@
                   </a:schemeClr>
                 </a:solidFill>
               </a:rPr>
-              <a:t>+ Non relationnel de base mais peu le devenir</a:t>
+              <a:t>+ Non relationnel de base mais </a:t>
+            </a:r>
+            <a:r>
+              <a:rPr lang="fr-FR" dirty="0" smtClean="0">
+                <a:solidFill>
+                  <a:schemeClr val="accent2">
+                    <a:lumMod val="40000"/>
+                    <a:lumOff val="60000"/>
+                  </a:schemeClr>
+                </a:solidFill>
+              </a:rPr>
+              <a:t>peut </a:t>
+            </a:r>
+            <a:r>
+              <a:rPr lang="fr-FR" dirty="0">
+                <a:solidFill>
+                  <a:schemeClr val="accent2">
+                    <a:lumMod val="40000"/>
+                    <a:lumOff val="60000"/>
+                  </a:schemeClr>
+                </a:solidFill>
+              </a:rPr>
+              <a:t>le devenir</a:t>
             </a:r>
           </a:p>
           <a:p>

</xml_diff>

<commit_message>
Aaaahhhhhh des fautes d'orthographe (#20)
+1
</commit_message>
<xml_diff>
--- a/Presentation Cloud.pptx
+++ b/Presentation Cloud.pptx
@@ -1345,7 +1345,7 @@
           <a:noFill/>
           <a:extLst>
             <a:ext uri="{909E8E84-426E-40dd-AFC4-6F175D3DCCD1}">
-              <a14:hiddenFill xmlns:a14="http://schemas.microsoft.com/office/drawing/2010/main" xmlns="">
+              <a14:hiddenFill xmlns="" xmlns:a14="http://schemas.microsoft.com/office/drawing/2010/main">
                 <a:solidFill>
                   <a:srgbClr val="FFFFFF"/>
                 </a:solidFill>
@@ -1405,7 +1405,7 @@
             </a:ln>
             <a:extLst>
               <a:ext uri="{91240B29-F687-4f45-9708-019B960494DF}">
-                <a14:hiddenLine xmlns:a14="http://schemas.microsoft.com/office/drawing/2010/main" xmlns="" w="9525">
+                <a14:hiddenLine xmlns="" xmlns:a14="http://schemas.microsoft.com/office/drawing/2010/main" w="9525">
                   <a:solidFill>
                     <a:srgbClr val="000000"/>
                   </a:solidFill>
@@ -1495,7 +1495,7 @@
             </a:ln>
             <a:extLst>
               <a:ext uri="{91240B29-F687-4f45-9708-019B960494DF}">
-                <a14:hiddenLine xmlns:a14="http://schemas.microsoft.com/office/drawing/2010/main" xmlns="" w="9525">
+                <a14:hiddenLine xmlns="" xmlns:a14="http://schemas.microsoft.com/office/drawing/2010/main" w="9525">
                   <a:solidFill>
                     <a:srgbClr val="000000"/>
                   </a:solidFill>
@@ -1585,7 +1585,7 @@
             </a:ln>
             <a:extLst>
               <a:ext uri="{91240B29-F687-4f45-9708-019B960494DF}">
-                <a14:hiddenLine xmlns:a14="http://schemas.microsoft.com/office/drawing/2010/main" xmlns="" w="9525">
+                <a14:hiddenLine xmlns="" xmlns:a14="http://schemas.microsoft.com/office/drawing/2010/main" w="9525">
                   <a:solidFill>
                     <a:srgbClr val="000000"/>
                   </a:solidFill>
@@ -1619,7 +1619,7 @@
             </a:ln>
             <a:extLst>
               <a:ext uri="{91240B29-F687-4f45-9708-019B960494DF}">
-                <a14:hiddenLine xmlns:a14="http://schemas.microsoft.com/office/drawing/2010/main" xmlns="" w="9525">
+                <a14:hiddenLine xmlns="" xmlns:a14="http://schemas.microsoft.com/office/drawing/2010/main" w="9525">
                   <a:solidFill>
                     <a:srgbClr val="000000"/>
                   </a:solidFill>
@@ -1709,7 +1709,7 @@
             </a:ln>
             <a:extLst>
               <a:ext uri="{91240B29-F687-4f45-9708-019B960494DF}">
-                <a14:hiddenLine xmlns:a14="http://schemas.microsoft.com/office/drawing/2010/main" xmlns="" w="9525">
+                <a14:hiddenLine xmlns="" xmlns:a14="http://schemas.microsoft.com/office/drawing/2010/main" w="9525">
                   <a:solidFill>
                     <a:srgbClr val="000000"/>
                   </a:solidFill>
@@ -1771,7 +1771,7 @@
             </a:ln>
             <a:extLst>
               <a:ext uri="{91240B29-F687-4f45-9708-019B960494DF}">
-                <a14:hiddenLine xmlns:a14="http://schemas.microsoft.com/office/drawing/2010/main" xmlns="" w="9525">
+                <a14:hiddenLine xmlns="" xmlns:a14="http://schemas.microsoft.com/office/drawing/2010/main" w="9525">
                   <a:solidFill>
                     <a:srgbClr val="000000"/>
                   </a:solidFill>
@@ -1833,7 +1833,7 @@
             </a:ln>
             <a:extLst>
               <a:ext uri="{91240B29-F687-4f45-9708-019B960494DF}">
-                <a14:hiddenLine xmlns:a14="http://schemas.microsoft.com/office/drawing/2010/main" xmlns="" w="9525">
+                <a14:hiddenLine xmlns="" xmlns:a14="http://schemas.microsoft.com/office/drawing/2010/main" w="9525">
                   <a:solidFill>
                     <a:srgbClr val="000000"/>
                   </a:solidFill>
@@ -1923,7 +1923,7 @@
             </a:ln>
             <a:extLst>
               <a:ext uri="{91240B29-F687-4f45-9708-019B960494DF}">
-                <a14:hiddenLine xmlns:a14="http://schemas.microsoft.com/office/drawing/2010/main" xmlns="" w="9525">
+                <a14:hiddenLine xmlns="" xmlns:a14="http://schemas.microsoft.com/office/drawing/2010/main" w="9525">
                   <a:solidFill>
                     <a:srgbClr val="000000"/>
                   </a:solidFill>
@@ -1985,7 +1985,7 @@
             </a:ln>
             <a:extLst>
               <a:ext uri="{91240B29-F687-4f45-9708-019B960494DF}">
-                <a14:hiddenLine xmlns:a14="http://schemas.microsoft.com/office/drawing/2010/main" xmlns="" w="9525">
+                <a14:hiddenLine xmlns="" xmlns:a14="http://schemas.microsoft.com/office/drawing/2010/main" w="9525">
                   <a:solidFill>
                     <a:srgbClr val="000000"/>
                   </a:solidFill>
@@ -2047,7 +2047,7 @@
             </a:ln>
             <a:extLst>
               <a:ext uri="{91240B29-F687-4f45-9708-019B960494DF}">
-                <a14:hiddenLine xmlns:a14="http://schemas.microsoft.com/office/drawing/2010/main" xmlns="" w="9525">
+                <a14:hiddenLine xmlns="" xmlns:a14="http://schemas.microsoft.com/office/drawing/2010/main" w="9525">
                   <a:solidFill>
                     <a:srgbClr val="000000"/>
                   </a:solidFill>
@@ -2137,7 +2137,7 @@
             </a:ln>
             <a:extLst>
               <a:ext uri="{91240B29-F687-4f45-9708-019B960494DF}">
-                <a14:hiddenLine xmlns:a14="http://schemas.microsoft.com/office/drawing/2010/main" xmlns="" w="9525">
+                <a14:hiddenLine xmlns="" xmlns:a14="http://schemas.microsoft.com/office/drawing/2010/main" w="9525">
                   <a:solidFill>
                     <a:srgbClr val="000000"/>
                   </a:solidFill>
@@ -2227,7 +2227,7 @@
             </a:ln>
             <a:extLst>
               <a:ext uri="{91240B29-F687-4f45-9708-019B960494DF}">
-                <a14:hiddenLine xmlns:a14="http://schemas.microsoft.com/office/drawing/2010/main" xmlns="" w="9525">
+                <a14:hiddenLine xmlns="" xmlns:a14="http://schemas.microsoft.com/office/drawing/2010/main" w="9525">
                   <a:solidFill>
                     <a:srgbClr val="000000"/>
                   </a:solidFill>
@@ -2289,7 +2289,7 @@
             </a:ln>
             <a:extLst>
               <a:ext uri="{91240B29-F687-4f45-9708-019B960494DF}">
-                <a14:hiddenLine xmlns:a14="http://schemas.microsoft.com/office/drawing/2010/main" xmlns="" w="9525">
+                <a14:hiddenLine xmlns="" xmlns:a14="http://schemas.microsoft.com/office/drawing/2010/main" w="9525">
                   <a:solidFill>
                     <a:srgbClr val="000000"/>
                   </a:solidFill>
@@ -2399,7 +2399,7 @@
             </a:ln>
             <a:extLst>
               <a:ext uri="{91240B29-F687-4f45-9708-019B960494DF}">
-                <a14:hiddenLine xmlns:a14="http://schemas.microsoft.com/office/drawing/2010/main" xmlns="" w="9525">
+                <a14:hiddenLine xmlns="" xmlns:a14="http://schemas.microsoft.com/office/drawing/2010/main" w="9525">
                   <a:solidFill>
                     <a:srgbClr val="000000"/>
                   </a:solidFill>
@@ -2461,7 +2461,7 @@
             </a:ln>
             <a:extLst>
               <a:ext uri="{91240B29-F687-4f45-9708-019B960494DF}">
-                <a14:hiddenLine xmlns:a14="http://schemas.microsoft.com/office/drawing/2010/main" xmlns="" w="9525">
+                <a14:hiddenLine xmlns="" xmlns:a14="http://schemas.microsoft.com/office/drawing/2010/main" w="9525">
                   <a:solidFill>
                     <a:srgbClr val="000000"/>
                   </a:solidFill>
@@ -2551,7 +2551,7 @@
             </a:ln>
             <a:extLst>
               <a:ext uri="{91240B29-F687-4f45-9708-019B960494DF}">
-                <a14:hiddenLine xmlns:a14="http://schemas.microsoft.com/office/drawing/2010/main" xmlns="" w="9525">
+                <a14:hiddenLine xmlns="" xmlns:a14="http://schemas.microsoft.com/office/drawing/2010/main" w="9525">
                   <a:solidFill>
                     <a:srgbClr val="000000"/>
                   </a:solidFill>
@@ -2641,7 +2641,7 @@
             </a:ln>
             <a:extLst>
               <a:ext uri="{91240B29-F687-4f45-9708-019B960494DF}">
-                <a14:hiddenLine xmlns:a14="http://schemas.microsoft.com/office/drawing/2010/main" xmlns="" w="9525">
+                <a14:hiddenLine xmlns="" xmlns:a14="http://schemas.microsoft.com/office/drawing/2010/main" w="9525">
                   <a:solidFill>
                     <a:srgbClr val="000000"/>
                   </a:solidFill>
@@ -2703,7 +2703,7 @@
             </a:ln>
             <a:extLst>
               <a:ext uri="{91240B29-F687-4f45-9708-019B960494DF}">
-                <a14:hiddenLine xmlns:a14="http://schemas.microsoft.com/office/drawing/2010/main" xmlns="" w="9525">
+                <a14:hiddenLine xmlns="" xmlns:a14="http://schemas.microsoft.com/office/drawing/2010/main" w="9525">
                   <a:solidFill>
                     <a:srgbClr val="000000"/>
                   </a:solidFill>
@@ -2793,7 +2793,7 @@
             </a:ln>
             <a:extLst>
               <a:ext uri="{91240B29-F687-4f45-9708-019B960494DF}">
-                <a14:hiddenLine xmlns:a14="http://schemas.microsoft.com/office/drawing/2010/main" xmlns="" w="9525">
+                <a14:hiddenLine xmlns="" xmlns:a14="http://schemas.microsoft.com/office/drawing/2010/main" w="9525">
                   <a:solidFill>
                     <a:srgbClr val="000000"/>
                   </a:solidFill>
@@ -2883,7 +2883,7 @@
             </a:ln>
             <a:extLst>
               <a:ext uri="{91240B29-F687-4f45-9708-019B960494DF}">
-                <a14:hiddenLine xmlns:a14="http://schemas.microsoft.com/office/drawing/2010/main" xmlns="" w="9525">
+                <a14:hiddenLine xmlns="" xmlns:a14="http://schemas.microsoft.com/office/drawing/2010/main" w="9525">
                   <a:solidFill>
                     <a:srgbClr val="000000"/>
                   </a:solidFill>
@@ -2939,7 +2939,7 @@
             </a:ln>
             <a:extLst>
               <a:ext uri="{91240B29-F687-4f45-9708-019B960494DF}">
-                <a14:hiddenLine xmlns:a14="http://schemas.microsoft.com/office/drawing/2010/main" xmlns="" w="9525">
+                <a14:hiddenLine xmlns="" xmlns:a14="http://schemas.microsoft.com/office/drawing/2010/main" w="9525">
                   <a:solidFill>
                     <a:srgbClr val="000000"/>
                   </a:solidFill>
@@ -3029,7 +3029,7 @@
             </a:ln>
             <a:extLst>
               <a:ext uri="{91240B29-F687-4f45-9708-019B960494DF}">
-                <a14:hiddenLine xmlns:a14="http://schemas.microsoft.com/office/drawing/2010/main" xmlns="" w="9525">
+                <a14:hiddenLine xmlns="" xmlns:a14="http://schemas.microsoft.com/office/drawing/2010/main" w="9525">
                   <a:solidFill>
                     <a:srgbClr val="000000"/>
                   </a:solidFill>
@@ -3085,7 +3085,7 @@
             </a:ln>
             <a:extLst>
               <a:ext uri="{91240B29-F687-4f45-9708-019B960494DF}">
-                <a14:hiddenLine xmlns:a14="http://schemas.microsoft.com/office/drawing/2010/main" xmlns="" w="9525">
+                <a14:hiddenLine xmlns="" xmlns:a14="http://schemas.microsoft.com/office/drawing/2010/main" w="9525">
                   <a:solidFill>
                     <a:srgbClr val="000000"/>
                   </a:solidFill>
@@ -3175,7 +3175,7 @@
             </a:ln>
             <a:extLst>
               <a:ext uri="{91240B29-F687-4f45-9708-019B960494DF}">
-                <a14:hiddenLine xmlns:a14="http://schemas.microsoft.com/office/drawing/2010/main" xmlns="" w="9525">
+                <a14:hiddenLine xmlns="" xmlns:a14="http://schemas.microsoft.com/office/drawing/2010/main" w="9525">
                   <a:solidFill>
                     <a:srgbClr val="000000"/>
                   </a:solidFill>
@@ -3243,7 +3243,7 @@
             </a:ln>
             <a:extLst>
               <a:ext uri="{91240B29-F687-4f45-9708-019B960494DF}">
-                <a14:hiddenLine xmlns:a14="http://schemas.microsoft.com/office/drawing/2010/main" xmlns="" w="9525">
+                <a14:hiddenLine xmlns="" xmlns:a14="http://schemas.microsoft.com/office/drawing/2010/main" w="9525">
                   <a:solidFill>
                     <a:srgbClr val="000000"/>
                   </a:solidFill>
@@ -3333,7 +3333,7 @@
             </a:ln>
             <a:extLst>
               <a:ext uri="{91240B29-F687-4f45-9708-019B960494DF}">
-                <a14:hiddenLine xmlns:a14="http://schemas.microsoft.com/office/drawing/2010/main" xmlns="" w="9525">
+                <a14:hiddenLine xmlns="" xmlns:a14="http://schemas.microsoft.com/office/drawing/2010/main" w="9525">
                   <a:solidFill>
                     <a:srgbClr val="000000"/>
                   </a:solidFill>
@@ -3401,7 +3401,7 @@
             </a:ln>
             <a:extLst>
               <a:ext uri="{91240B29-F687-4f45-9708-019B960494DF}">
-                <a14:hiddenLine xmlns:a14="http://schemas.microsoft.com/office/drawing/2010/main" xmlns="" w="9525">
+                <a14:hiddenLine xmlns="" xmlns:a14="http://schemas.microsoft.com/office/drawing/2010/main" w="9525">
                   <a:solidFill>
                     <a:srgbClr val="000000"/>
                   </a:solidFill>
@@ -3491,7 +3491,7 @@
             </a:ln>
             <a:extLst>
               <a:ext uri="{91240B29-F687-4f45-9708-019B960494DF}">
-                <a14:hiddenLine xmlns:a14="http://schemas.microsoft.com/office/drawing/2010/main" xmlns="" w="9525">
+                <a14:hiddenLine xmlns="" xmlns:a14="http://schemas.microsoft.com/office/drawing/2010/main" w="9525">
                   <a:solidFill>
                     <a:srgbClr val="000000"/>
                   </a:solidFill>
@@ -3525,7 +3525,7 @@
             </a:ln>
             <a:extLst>
               <a:ext uri="{91240B29-F687-4f45-9708-019B960494DF}">
-                <a14:hiddenLine xmlns:a14="http://schemas.microsoft.com/office/drawing/2010/main" xmlns="" w="9525">
+                <a14:hiddenLine xmlns="" xmlns:a14="http://schemas.microsoft.com/office/drawing/2010/main" w="9525">
                   <a:solidFill>
                     <a:srgbClr val="000000"/>
                   </a:solidFill>
@@ -3615,7 +3615,7 @@
             </a:ln>
             <a:extLst>
               <a:ext uri="{91240B29-F687-4f45-9708-019B960494DF}">
-                <a14:hiddenLine xmlns:a14="http://schemas.microsoft.com/office/drawing/2010/main" xmlns="" w="9525">
+                <a14:hiddenLine xmlns="" xmlns:a14="http://schemas.microsoft.com/office/drawing/2010/main" w="9525">
                   <a:solidFill>
                     <a:srgbClr val="000000"/>
                   </a:solidFill>
@@ -3677,7 +3677,7 @@
             </a:ln>
             <a:extLst>
               <a:ext uri="{91240B29-F687-4f45-9708-019B960494DF}">
-                <a14:hiddenLine xmlns:a14="http://schemas.microsoft.com/office/drawing/2010/main" xmlns="" w="9525">
+                <a14:hiddenLine xmlns="" xmlns:a14="http://schemas.microsoft.com/office/drawing/2010/main" w="9525">
                   <a:solidFill>
                     <a:srgbClr val="000000"/>
                   </a:solidFill>
@@ -3739,7 +3739,7 @@
             </a:ln>
             <a:extLst>
               <a:ext uri="{91240B29-F687-4f45-9708-019B960494DF}">
-                <a14:hiddenLine xmlns:a14="http://schemas.microsoft.com/office/drawing/2010/main" xmlns="" w="9525">
+                <a14:hiddenLine xmlns="" xmlns:a14="http://schemas.microsoft.com/office/drawing/2010/main" w="9525">
                   <a:solidFill>
                     <a:srgbClr val="000000"/>
                   </a:solidFill>
@@ -3829,7 +3829,7 @@
             </a:ln>
             <a:extLst>
               <a:ext uri="{91240B29-F687-4f45-9708-019B960494DF}">
-                <a14:hiddenLine xmlns:a14="http://schemas.microsoft.com/office/drawing/2010/main" xmlns="" w="9525">
+                <a14:hiddenLine xmlns="" xmlns:a14="http://schemas.microsoft.com/office/drawing/2010/main" w="9525">
                   <a:solidFill>
                     <a:srgbClr val="000000"/>
                   </a:solidFill>
@@ -3897,7 +3897,7 @@
             </a:ln>
             <a:extLst>
               <a:ext uri="{91240B29-F687-4f45-9708-019B960494DF}">
-                <a14:hiddenLine xmlns:a14="http://schemas.microsoft.com/office/drawing/2010/main" xmlns="" w="9525">
+                <a14:hiddenLine xmlns="" xmlns:a14="http://schemas.microsoft.com/office/drawing/2010/main" w="9525">
                   <a:solidFill>
                     <a:srgbClr val="000000"/>
                   </a:solidFill>
@@ -3959,7 +3959,7 @@
             </a:ln>
             <a:extLst>
               <a:ext uri="{91240B29-F687-4f45-9708-019B960494DF}">
-                <a14:hiddenLine xmlns:a14="http://schemas.microsoft.com/office/drawing/2010/main" xmlns="" w="9525">
+                <a14:hiddenLine xmlns="" xmlns:a14="http://schemas.microsoft.com/office/drawing/2010/main" w="9525">
                   <a:solidFill>
                     <a:srgbClr val="000000"/>
                   </a:solidFill>
@@ -4049,7 +4049,7 @@
             </a:ln>
             <a:extLst>
               <a:ext uri="{91240B29-F687-4f45-9708-019B960494DF}">
-                <a14:hiddenLine xmlns:a14="http://schemas.microsoft.com/office/drawing/2010/main" xmlns="" w="9525">
+                <a14:hiddenLine xmlns="" xmlns:a14="http://schemas.microsoft.com/office/drawing/2010/main" w="9525">
                   <a:solidFill>
                     <a:srgbClr val="000000"/>
                   </a:solidFill>
@@ -4111,7 +4111,7 @@
             </a:ln>
             <a:extLst>
               <a:ext uri="{91240B29-F687-4f45-9708-019B960494DF}">
-                <a14:hiddenLine xmlns:a14="http://schemas.microsoft.com/office/drawing/2010/main" xmlns="" w="9525">
+                <a14:hiddenLine xmlns="" xmlns:a14="http://schemas.microsoft.com/office/drawing/2010/main" w="9525">
                   <a:solidFill>
                     <a:srgbClr val="000000"/>
                   </a:solidFill>
@@ -4201,7 +4201,7 @@
             </a:ln>
             <a:extLst>
               <a:ext uri="{91240B29-F687-4f45-9708-019B960494DF}">
-                <a14:hiddenLine xmlns:a14="http://schemas.microsoft.com/office/drawing/2010/main" xmlns="" w="9525">
+                <a14:hiddenLine xmlns="" xmlns:a14="http://schemas.microsoft.com/office/drawing/2010/main" w="9525">
                   <a:solidFill>
                     <a:srgbClr val="000000"/>
                   </a:solidFill>
@@ -4263,7 +4263,7 @@
             </a:ln>
             <a:extLst>
               <a:ext uri="{91240B29-F687-4f45-9708-019B960494DF}">
-                <a14:hiddenLine xmlns:a14="http://schemas.microsoft.com/office/drawing/2010/main" xmlns="" w="9525">
+                <a14:hiddenLine xmlns="" xmlns:a14="http://schemas.microsoft.com/office/drawing/2010/main" w="9525">
                   <a:solidFill>
                     <a:srgbClr val="000000"/>
                   </a:solidFill>
@@ -4353,7 +4353,7 @@
             </a:ln>
             <a:extLst>
               <a:ext uri="{91240B29-F687-4f45-9708-019B960494DF}">
-                <a14:hiddenLine xmlns:a14="http://schemas.microsoft.com/office/drawing/2010/main" xmlns="" w="9525">
+                <a14:hiddenLine xmlns="" xmlns:a14="http://schemas.microsoft.com/office/drawing/2010/main" w="9525">
                   <a:solidFill>
                     <a:srgbClr val="000000"/>
                   </a:solidFill>
@@ -4387,7 +4387,7 @@
             </a:ln>
             <a:extLst>
               <a:ext uri="{91240B29-F687-4f45-9708-019B960494DF}">
-                <a14:hiddenLine xmlns:a14="http://schemas.microsoft.com/office/drawing/2010/main" xmlns="" w="9525">
+                <a14:hiddenLine xmlns="" xmlns:a14="http://schemas.microsoft.com/office/drawing/2010/main" w="9525">
                   <a:solidFill>
                     <a:srgbClr val="000000"/>
                   </a:solidFill>
@@ -4452,7 +4452,7 @@
             </a:ln>
             <a:extLst>
               <a:ext uri="{91240B29-F687-4f45-9708-019B960494DF}">
-                <a14:hiddenLine xmlns:a14="http://schemas.microsoft.com/office/drawing/2010/main" xmlns="" w="9525">
+                <a14:hiddenLine xmlns="" xmlns:a14="http://schemas.microsoft.com/office/drawing/2010/main" w="9525">
                   <a:solidFill>
                     <a:srgbClr val="000000"/>
                   </a:solidFill>
@@ -4542,7 +4542,7 @@
             </a:ln>
             <a:extLst>
               <a:ext uri="{91240B29-F687-4f45-9708-019B960494DF}">
-                <a14:hiddenLine xmlns:a14="http://schemas.microsoft.com/office/drawing/2010/main" xmlns="" w="9525">
+                <a14:hiddenLine xmlns="" xmlns:a14="http://schemas.microsoft.com/office/drawing/2010/main" w="9525">
                   <a:solidFill>
                     <a:srgbClr val="000000"/>
                   </a:solidFill>
@@ -4604,7 +4604,7 @@
             </a:ln>
             <a:extLst>
               <a:ext uri="{91240B29-F687-4f45-9708-019B960494DF}">
-                <a14:hiddenLine xmlns:a14="http://schemas.microsoft.com/office/drawing/2010/main" xmlns="" w="9525">
+                <a14:hiddenLine xmlns="" xmlns:a14="http://schemas.microsoft.com/office/drawing/2010/main" w="9525">
                   <a:solidFill>
                     <a:srgbClr val="000000"/>
                   </a:solidFill>
@@ -4694,7 +4694,7 @@
             </a:ln>
             <a:extLst>
               <a:ext uri="{91240B29-F687-4f45-9708-019B960494DF}">
-                <a14:hiddenLine xmlns:a14="http://schemas.microsoft.com/office/drawing/2010/main" xmlns="" w="9525">
+                <a14:hiddenLine xmlns="" xmlns:a14="http://schemas.microsoft.com/office/drawing/2010/main" w="9525">
                   <a:solidFill>
                     <a:srgbClr val="000000"/>
                   </a:solidFill>
@@ -4784,7 +4784,7 @@
             </a:ln>
             <a:extLst>
               <a:ext uri="{91240B29-F687-4f45-9708-019B960494DF}">
-                <a14:hiddenLine xmlns:a14="http://schemas.microsoft.com/office/drawing/2010/main" xmlns="" w="9525">
+                <a14:hiddenLine xmlns="" xmlns:a14="http://schemas.microsoft.com/office/drawing/2010/main" w="9525">
                   <a:solidFill>
                     <a:srgbClr val="000000"/>
                   </a:solidFill>
@@ -4849,7 +4849,7 @@
             </a:ln>
             <a:extLst>
               <a:ext uri="{91240B29-F687-4f45-9708-019B960494DF}">
-                <a14:hiddenLine xmlns:a14="http://schemas.microsoft.com/office/drawing/2010/main" xmlns="" w="9525">
+                <a14:hiddenLine xmlns="" xmlns:a14="http://schemas.microsoft.com/office/drawing/2010/main" w="9525">
                   <a:solidFill>
                     <a:srgbClr val="000000"/>
                   </a:solidFill>
@@ -4911,7 +4911,7 @@
             </a:ln>
             <a:extLst>
               <a:ext uri="{91240B29-F687-4f45-9708-019B960494DF}">
-                <a14:hiddenLine xmlns:a14="http://schemas.microsoft.com/office/drawing/2010/main" xmlns="" w="9525">
+                <a14:hiddenLine xmlns="" xmlns:a14="http://schemas.microsoft.com/office/drawing/2010/main" w="9525">
                   <a:solidFill>
                     <a:srgbClr val="000000"/>
                   </a:solidFill>
@@ -5001,7 +5001,7 @@
             </a:ln>
             <a:extLst>
               <a:ext uri="{91240B29-F687-4f45-9708-019B960494DF}">
-                <a14:hiddenLine xmlns:a14="http://schemas.microsoft.com/office/drawing/2010/main" xmlns="" w="9525">
+                <a14:hiddenLine xmlns="" xmlns:a14="http://schemas.microsoft.com/office/drawing/2010/main" w="9525">
                   <a:solidFill>
                     <a:srgbClr val="000000"/>
                   </a:solidFill>
@@ -5091,7 +5091,7 @@
             </a:ln>
             <a:extLst>
               <a:ext uri="{91240B29-F687-4f45-9708-019B960494DF}">
-                <a14:hiddenLine xmlns:a14="http://schemas.microsoft.com/office/drawing/2010/main" xmlns="" w="9525">
+                <a14:hiddenLine xmlns="" xmlns:a14="http://schemas.microsoft.com/office/drawing/2010/main" w="9525">
                   <a:solidFill>
                     <a:srgbClr val="000000"/>
                   </a:solidFill>
@@ -5153,7 +5153,7 @@
             </a:ln>
             <a:extLst>
               <a:ext uri="{91240B29-F687-4f45-9708-019B960494DF}">
-                <a14:hiddenLine xmlns:a14="http://schemas.microsoft.com/office/drawing/2010/main" xmlns="" w="9525">
+                <a14:hiddenLine xmlns="" xmlns:a14="http://schemas.microsoft.com/office/drawing/2010/main" w="9525">
                   <a:solidFill>
                     <a:srgbClr val="000000"/>
                   </a:solidFill>
@@ -5273,7 +5273,7 @@
             </a:ln>
             <a:extLst>
               <a:ext uri="{91240B29-F687-4f45-9708-019B960494DF}">
-                <a14:hiddenLine xmlns:a14="http://schemas.microsoft.com/office/drawing/2010/main" xmlns="" w="9525">
+                <a14:hiddenLine xmlns="" xmlns:a14="http://schemas.microsoft.com/office/drawing/2010/main" w="9525">
                   <a:solidFill>
                     <a:srgbClr val="000000"/>
                   </a:solidFill>
@@ -5341,7 +5341,7 @@
             </a:ln>
             <a:extLst>
               <a:ext uri="{91240B29-F687-4f45-9708-019B960494DF}">
-                <a14:hiddenLine xmlns:a14="http://schemas.microsoft.com/office/drawing/2010/main" xmlns="" w="9525">
+                <a14:hiddenLine xmlns="" xmlns:a14="http://schemas.microsoft.com/office/drawing/2010/main" w="9525">
                   <a:solidFill>
                     <a:srgbClr val="000000"/>
                   </a:solidFill>
@@ -5431,7 +5431,7 @@
             </a:ln>
             <a:extLst>
               <a:ext uri="{91240B29-F687-4f45-9708-019B960494DF}">
-                <a14:hiddenLine xmlns:a14="http://schemas.microsoft.com/office/drawing/2010/main" xmlns="" w="9525">
+                <a14:hiddenLine xmlns="" xmlns:a14="http://schemas.microsoft.com/office/drawing/2010/main" w="9525">
                   <a:solidFill>
                     <a:srgbClr val="000000"/>
                   </a:solidFill>
@@ -10306,7 +10306,7 @@
           <a:noFill/>
           <a:extLst>
             <a:ext uri="{909E8E84-426E-40dd-AFC4-6F175D3DCCD1}">
-              <a14:hiddenFill xmlns:a14="http://schemas.microsoft.com/office/drawing/2010/main" xmlns="">
+              <a14:hiddenFill xmlns="" xmlns:a14="http://schemas.microsoft.com/office/drawing/2010/main">
                 <a:solidFill>
                   <a:srgbClr val="FFFFFF"/>
                 </a:solidFill>
@@ -10380,7 +10380,7 @@
               </a:ln>
               <a:extLst>
                 <a:ext uri="{91240B29-F687-4f45-9708-019B960494DF}">
-                  <a14:hiddenLine xmlns:a14="http://schemas.microsoft.com/office/drawing/2010/main" xmlns="" w="9525">
+                  <a14:hiddenLine xmlns="" xmlns:a14="http://schemas.microsoft.com/office/drawing/2010/main" w="9525">
                     <a:solidFill>
                       <a:srgbClr val="000000"/>
                     </a:solidFill>
@@ -10470,7 +10470,7 @@
               </a:ln>
               <a:extLst>
                 <a:ext uri="{91240B29-F687-4f45-9708-019B960494DF}">
-                  <a14:hiddenLine xmlns:a14="http://schemas.microsoft.com/office/drawing/2010/main" xmlns="" w="9525">
+                  <a14:hiddenLine xmlns="" xmlns:a14="http://schemas.microsoft.com/office/drawing/2010/main" w="9525">
                     <a:solidFill>
                       <a:srgbClr val="000000"/>
                     </a:solidFill>
@@ -10560,7 +10560,7 @@
               </a:ln>
               <a:extLst>
                 <a:ext uri="{91240B29-F687-4f45-9708-019B960494DF}">
-                  <a14:hiddenLine xmlns:a14="http://schemas.microsoft.com/office/drawing/2010/main" xmlns="" w="9525">
+                  <a14:hiddenLine xmlns="" xmlns:a14="http://schemas.microsoft.com/office/drawing/2010/main" w="9525">
                     <a:solidFill>
                       <a:srgbClr val="000000"/>
                     </a:solidFill>
@@ -10622,7 +10622,7 @@
               </a:ln>
               <a:extLst>
                 <a:ext uri="{91240B29-F687-4f45-9708-019B960494DF}">
-                  <a14:hiddenLine xmlns:a14="http://schemas.microsoft.com/office/drawing/2010/main" xmlns="" w="9525">
+                  <a14:hiddenLine xmlns="" xmlns:a14="http://schemas.microsoft.com/office/drawing/2010/main" w="9525">
                     <a:solidFill>
                       <a:srgbClr val="000000"/>
                     </a:solidFill>
@@ -10712,7 +10712,7 @@
               </a:ln>
               <a:extLst>
                 <a:ext uri="{91240B29-F687-4f45-9708-019B960494DF}">
-                  <a14:hiddenLine xmlns:a14="http://schemas.microsoft.com/office/drawing/2010/main" xmlns="" w="9525">
+                  <a14:hiddenLine xmlns="" xmlns:a14="http://schemas.microsoft.com/office/drawing/2010/main" w="9525">
                     <a:solidFill>
                       <a:srgbClr val="000000"/>
                     </a:solidFill>
@@ -10774,7 +10774,7 @@
               </a:ln>
               <a:extLst>
                 <a:ext uri="{91240B29-F687-4f45-9708-019B960494DF}">
-                  <a14:hiddenLine xmlns:a14="http://schemas.microsoft.com/office/drawing/2010/main" xmlns="" w="9525">
+                  <a14:hiddenLine xmlns="" xmlns:a14="http://schemas.microsoft.com/office/drawing/2010/main" w="9525">
                     <a:solidFill>
                       <a:srgbClr val="000000"/>
                     </a:solidFill>
@@ -10836,7 +10836,7 @@
               </a:ln>
               <a:extLst>
                 <a:ext uri="{91240B29-F687-4f45-9708-019B960494DF}">
-                  <a14:hiddenLine xmlns:a14="http://schemas.microsoft.com/office/drawing/2010/main" xmlns="" w="9525">
+                  <a14:hiddenLine xmlns="" xmlns:a14="http://schemas.microsoft.com/office/drawing/2010/main" w="9525">
                     <a:solidFill>
                       <a:srgbClr val="000000"/>
                     </a:solidFill>
@@ -10926,7 +10926,7 @@
               </a:ln>
               <a:extLst>
                 <a:ext uri="{91240B29-F687-4f45-9708-019B960494DF}">
-                  <a14:hiddenLine xmlns:a14="http://schemas.microsoft.com/office/drawing/2010/main" xmlns="" w="9525">
+                  <a14:hiddenLine xmlns="" xmlns:a14="http://schemas.microsoft.com/office/drawing/2010/main" w="9525">
                     <a:solidFill>
                       <a:srgbClr val="000000"/>
                     </a:solidFill>
@@ -11016,7 +11016,7 @@
               </a:ln>
               <a:extLst>
                 <a:ext uri="{91240B29-F687-4f45-9708-019B960494DF}">
-                  <a14:hiddenLine xmlns:a14="http://schemas.microsoft.com/office/drawing/2010/main" xmlns="" w="9525">
+                  <a14:hiddenLine xmlns="" xmlns:a14="http://schemas.microsoft.com/office/drawing/2010/main" w="9525">
                     <a:solidFill>
                       <a:srgbClr val="000000"/>
                     </a:solidFill>
@@ -11078,7 +11078,7 @@
               </a:ln>
               <a:extLst>
                 <a:ext uri="{91240B29-F687-4f45-9708-019B960494DF}">
-                  <a14:hiddenLine xmlns:a14="http://schemas.microsoft.com/office/drawing/2010/main" xmlns="" w="9525">
+                  <a14:hiddenLine xmlns="" xmlns:a14="http://schemas.microsoft.com/office/drawing/2010/main" w="9525">
                     <a:solidFill>
                       <a:srgbClr val="000000"/>
                     </a:solidFill>
@@ -11188,7 +11188,7 @@
               </a:ln>
               <a:extLst>
                 <a:ext uri="{91240B29-F687-4f45-9708-019B960494DF}">
-                  <a14:hiddenLine xmlns:a14="http://schemas.microsoft.com/office/drawing/2010/main" xmlns="" w="9525">
+                  <a14:hiddenLine xmlns="" xmlns:a14="http://schemas.microsoft.com/office/drawing/2010/main" w="9525">
                     <a:solidFill>
                       <a:srgbClr val="000000"/>
                     </a:solidFill>
@@ -11272,7 +11272,7 @@
               </a:ln>
               <a:extLst>
                 <a:ext uri="{91240B29-F687-4f45-9708-019B960494DF}">
-                  <a14:hiddenLine xmlns:a14="http://schemas.microsoft.com/office/drawing/2010/main" xmlns="" w="9525">
+                  <a14:hiddenLine xmlns="" xmlns:a14="http://schemas.microsoft.com/office/drawing/2010/main" w="9525">
                     <a:solidFill>
                       <a:srgbClr val="000000"/>
                     </a:solidFill>
@@ -11334,7 +11334,7 @@
               </a:ln>
               <a:extLst>
                 <a:ext uri="{91240B29-F687-4f45-9708-019B960494DF}">
-                  <a14:hiddenLine xmlns:a14="http://schemas.microsoft.com/office/drawing/2010/main" xmlns="" w="9525">
+                  <a14:hiddenLine xmlns="" xmlns:a14="http://schemas.microsoft.com/office/drawing/2010/main" w="9525">
                     <a:solidFill>
                       <a:srgbClr val="000000"/>
                     </a:solidFill>
@@ -11396,7 +11396,7 @@
               </a:ln>
               <a:extLst>
                 <a:ext uri="{91240B29-F687-4f45-9708-019B960494DF}">
-                  <a14:hiddenLine xmlns:a14="http://schemas.microsoft.com/office/drawing/2010/main" xmlns="" w="9525">
+                  <a14:hiddenLine xmlns="" xmlns:a14="http://schemas.microsoft.com/office/drawing/2010/main" w="9525">
                     <a:solidFill>
                       <a:srgbClr val="000000"/>
                     </a:solidFill>
@@ -11486,7 +11486,7 @@
               </a:ln>
               <a:extLst>
                 <a:ext uri="{91240B29-F687-4f45-9708-019B960494DF}">
-                  <a14:hiddenLine xmlns:a14="http://schemas.microsoft.com/office/drawing/2010/main" xmlns="" w="9525">
+                  <a14:hiddenLine xmlns="" xmlns:a14="http://schemas.microsoft.com/office/drawing/2010/main" w="9525">
                     <a:solidFill>
                       <a:srgbClr val="000000"/>
                     </a:solidFill>
@@ -11520,7 +11520,7 @@
               </a:ln>
               <a:extLst>
                 <a:ext uri="{91240B29-F687-4f45-9708-019B960494DF}">
-                  <a14:hiddenLine xmlns:a14="http://schemas.microsoft.com/office/drawing/2010/main" xmlns="" w="9525">
+                  <a14:hiddenLine xmlns="" xmlns:a14="http://schemas.microsoft.com/office/drawing/2010/main" w="9525">
                     <a:solidFill>
                       <a:srgbClr val="000000"/>
                     </a:solidFill>
@@ -11585,7 +11585,7 @@
               </a:ln>
               <a:extLst>
                 <a:ext uri="{91240B29-F687-4f45-9708-019B960494DF}">
-                  <a14:hiddenLine xmlns:a14="http://schemas.microsoft.com/office/drawing/2010/main" xmlns="" w="9525">
+                  <a14:hiddenLine xmlns="" xmlns:a14="http://schemas.microsoft.com/office/drawing/2010/main" w="9525">
                     <a:solidFill>
                       <a:srgbClr val="000000"/>
                     </a:solidFill>
@@ -11675,7 +11675,7 @@
               </a:ln>
               <a:extLst>
                 <a:ext uri="{91240B29-F687-4f45-9708-019B960494DF}">
-                  <a14:hiddenLine xmlns:a14="http://schemas.microsoft.com/office/drawing/2010/main" xmlns="" w="9525">
+                  <a14:hiddenLine xmlns="" xmlns:a14="http://schemas.microsoft.com/office/drawing/2010/main" w="9525">
                     <a:solidFill>
                       <a:srgbClr val="000000"/>
                     </a:solidFill>
@@ -11737,7 +11737,7 @@
               </a:ln>
               <a:extLst>
                 <a:ext uri="{91240B29-F687-4f45-9708-019B960494DF}">
-                  <a14:hiddenLine xmlns:a14="http://schemas.microsoft.com/office/drawing/2010/main" xmlns="" w="9525">
+                  <a14:hiddenLine xmlns="" xmlns:a14="http://schemas.microsoft.com/office/drawing/2010/main" w="9525">
                     <a:solidFill>
                       <a:srgbClr val="000000"/>
                     </a:solidFill>
@@ -11827,7 +11827,7 @@
               </a:ln>
               <a:extLst>
                 <a:ext uri="{91240B29-F687-4f45-9708-019B960494DF}">
-                  <a14:hiddenLine xmlns:a14="http://schemas.microsoft.com/office/drawing/2010/main" xmlns="" w="9525">
+                  <a14:hiddenLine xmlns="" xmlns:a14="http://schemas.microsoft.com/office/drawing/2010/main" w="9525">
                     <a:solidFill>
                       <a:srgbClr val="000000"/>
                     </a:solidFill>
@@ -11892,7 +11892,7 @@
               </a:ln>
               <a:extLst>
                 <a:ext uri="{91240B29-F687-4f45-9708-019B960494DF}">
-                  <a14:hiddenLine xmlns:a14="http://schemas.microsoft.com/office/drawing/2010/main" xmlns="" w="9525">
+                  <a14:hiddenLine xmlns="" xmlns:a14="http://schemas.microsoft.com/office/drawing/2010/main" w="9525">
                     <a:solidFill>
                       <a:srgbClr val="000000"/>
                     </a:solidFill>
@@ -11954,7 +11954,7 @@
               </a:ln>
               <a:extLst>
                 <a:ext uri="{91240B29-F687-4f45-9708-019B960494DF}">
-                  <a14:hiddenLine xmlns:a14="http://schemas.microsoft.com/office/drawing/2010/main" xmlns="" w="9525">
+                  <a14:hiddenLine xmlns="" xmlns:a14="http://schemas.microsoft.com/office/drawing/2010/main" w="9525">
                     <a:solidFill>
                       <a:srgbClr val="000000"/>
                     </a:solidFill>
@@ -12044,7 +12044,7 @@
               </a:ln>
               <a:extLst>
                 <a:ext uri="{91240B29-F687-4f45-9708-019B960494DF}">
-                  <a14:hiddenLine xmlns:a14="http://schemas.microsoft.com/office/drawing/2010/main" xmlns="" w="9525">
+                  <a14:hiddenLine xmlns="" xmlns:a14="http://schemas.microsoft.com/office/drawing/2010/main" w="9525">
                     <a:solidFill>
                       <a:srgbClr val="000000"/>
                     </a:solidFill>
@@ -12134,7 +12134,7 @@
               </a:ln>
               <a:extLst>
                 <a:ext uri="{91240B29-F687-4f45-9708-019B960494DF}">
-                  <a14:hiddenLine xmlns:a14="http://schemas.microsoft.com/office/drawing/2010/main" xmlns="" w="9525">
+                  <a14:hiddenLine xmlns="" xmlns:a14="http://schemas.microsoft.com/office/drawing/2010/main" w="9525">
                     <a:solidFill>
                       <a:srgbClr val="000000"/>
                     </a:solidFill>
@@ -12199,7 +12199,7 @@
               </a:ln>
               <a:extLst>
                 <a:ext uri="{91240B29-F687-4f45-9708-019B960494DF}">
-                  <a14:hiddenLine xmlns:a14="http://schemas.microsoft.com/office/drawing/2010/main" xmlns="" w="9525">
+                  <a14:hiddenLine xmlns="" xmlns:a14="http://schemas.microsoft.com/office/drawing/2010/main" w="9525">
                     <a:solidFill>
                       <a:srgbClr val="000000"/>
                     </a:solidFill>
@@ -12319,7 +12319,7 @@
               </a:ln>
               <a:extLst>
                 <a:ext uri="{91240B29-F687-4f45-9708-019B960494DF}">
-                  <a14:hiddenLine xmlns:a14="http://schemas.microsoft.com/office/drawing/2010/main" xmlns="" w="9525">
+                  <a14:hiddenLine xmlns="" xmlns:a14="http://schemas.microsoft.com/office/drawing/2010/main" w="9525">
                     <a:solidFill>
                       <a:srgbClr val="000000"/>
                     </a:solidFill>
@@ -12417,7 +12417,7 @@
               </a:ln>
               <a:extLst>
                 <a:ext uri="{91240B29-F687-4f45-9708-019B960494DF}">
-                  <a14:hiddenLine xmlns:a14="http://schemas.microsoft.com/office/drawing/2010/main" xmlns="" w="9525">
+                  <a14:hiddenLine xmlns="" xmlns:a14="http://schemas.microsoft.com/office/drawing/2010/main" w="9525">
                     <a:solidFill>
                       <a:srgbClr val="000000"/>
                     </a:solidFill>
@@ -12532,7 +12532,7 @@
               </a:ln>
               <a:extLst>
                 <a:ext uri="{91240B29-F687-4f45-9708-019B960494DF}">
-                  <a14:hiddenLine xmlns:a14="http://schemas.microsoft.com/office/drawing/2010/main" xmlns="" w="9525">
+                  <a14:hiddenLine xmlns="" xmlns:a14="http://schemas.microsoft.com/office/drawing/2010/main" w="9525">
                     <a:solidFill>
                       <a:srgbClr val="000000"/>
                     </a:solidFill>
@@ -12622,7 +12622,7 @@
               </a:ln>
               <a:extLst>
                 <a:ext uri="{91240B29-F687-4f45-9708-019B960494DF}">
-                  <a14:hiddenLine xmlns:a14="http://schemas.microsoft.com/office/drawing/2010/main" xmlns="" w="9525">
+                  <a14:hiddenLine xmlns="" xmlns:a14="http://schemas.microsoft.com/office/drawing/2010/main" w="9525">
                     <a:solidFill>
                       <a:srgbClr val="000000"/>
                     </a:solidFill>
@@ -12687,7 +12687,7 @@
               </a:ln>
               <a:extLst>
                 <a:ext uri="{91240B29-F687-4f45-9708-019B960494DF}">
-                  <a14:hiddenLine xmlns:a14="http://schemas.microsoft.com/office/drawing/2010/main" xmlns="" w="9525">
+                  <a14:hiddenLine xmlns="" xmlns:a14="http://schemas.microsoft.com/office/drawing/2010/main" w="9525">
                     <a:solidFill>
                       <a:srgbClr val="000000"/>
                     </a:solidFill>
@@ -12777,7 +12777,7 @@
               </a:ln>
               <a:extLst>
                 <a:ext uri="{91240B29-F687-4f45-9708-019B960494DF}">
-                  <a14:hiddenLine xmlns:a14="http://schemas.microsoft.com/office/drawing/2010/main" xmlns="" w="9525">
+                  <a14:hiddenLine xmlns="" xmlns:a14="http://schemas.microsoft.com/office/drawing/2010/main" w="9525">
                     <a:solidFill>
                       <a:srgbClr val="000000"/>
                     </a:solidFill>
@@ -12845,7 +12845,7 @@
               </a:ln>
               <a:extLst>
                 <a:ext uri="{91240B29-F687-4f45-9708-019B960494DF}">
-                  <a14:hiddenLine xmlns:a14="http://schemas.microsoft.com/office/drawing/2010/main" xmlns="" w="9525">
+                  <a14:hiddenLine xmlns="" xmlns:a14="http://schemas.microsoft.com/office/drawing/2010/main" w="9525">
                     <a:solidFill>
                       <a:srgbClr val="000000"/>
                     </a:solidFill>
@@ -12935,7 +12935,7 @@
               </a:ln>
               <a:extLst>
                 <a:ext uri="{91240B29-F687-4f45-9708-019B960494DF}">
-                  <a14:hiddenLine xmlns:a14="http://schemas.microsoft.com/office/drawing/2010/main" xmlns="" w="9525">
+                  <a14:hiddenLine xmlns="" xmlns:a14="http://schemas.microsoft.com/office/drawing/2010/main" w="9525">
                     <a:solidFill>
                       <a:srgbClr val="000000"/>
                     </a:solidFill>
@@ -13003,7 +13003,7 @@
               </a:ln>
               <a:extLst>
                 <a:ext uri="{91240B29-F687-4f45-9708-019B960494DF}">
-                  <a14:hiddenLine xmlns:a14="http://schemas.microsoft.com/office/drawing/2010/main" xmlns="" w="9525">
+                  <a14:hiddenLine xmlns="" xmlns:a14="http://schemas.microsoft.com/office/drawing/2010/main" w="9525">
                     <a:solidFill>
                       <a:srgbClr val="000000"/>
                     </a:solidFill>
@@ -13093,7 +13093,7 @@
               </a:ln>
               <a:extLst>
                 <a:ext uri="{91240B29-F687-4f45-9708-019B960494DF}">
-                  <a14:hiddenLine xmlns:a14="http://schemas.microsoft.com/office/drawing/2010/main" xmlns="" w="9525">
+                  <a14:hiddenLine xmlns="" xmlns:a14="http://schemas.microsoft.com/office/drawing/2010/main" w="9525">
                     <a:solidFill>
                       <a:srgbClr val="000000"/>
                     </a:solidFill>
@@ -13127,7 +13127,7 @@
               </a:ln>
               <a:extLst>
                 <a:ext uri="{91240B29-F687-4f45-9708-019B960494DF}">
-                  <a14:hiddenLine xmlns:a14="http://schemas.microsoft.com/office/drawing/2010/main" xmlns="" w="9525">
+                  <a14:hiddenLine xmlns="" xmlns:a14="http://schemas.microsoft.com/office/drawing/2010/main" w="9525">
                     <a:solidFill>
                       <a:srgbClr val="000000"/>
                     </a:solidFill>
@@ -13942,7 +13942,7 @@
           <p:nvPr/>
         </p:nvPicPr>
         <p:blipFill>
-          <a:blip r:embed="rId3">
+          <a:blip r:embed="rId3" cstate="hqprint">
             <a:extLst>
               <a:ext uri="{28A0092B-C50C-407E-A947-70E740481C1C}">
                 <a14:useLocalDpi xmlns:a14="http://schemas.microsoft.com/office/drawing/2010/main" val="0"/>
@@ -13988,8 +13988,8 @@
         </p:nvSpPr>
         <p:spPr>
           <a:xfrm>
-            <a:off x="5252355" y="2403640"/>
-            <a:ext cx="1943102" cy="461665"/>
+            <a:off x="4994412" y="2454969"/>
+            <a:ext cx="2835569" cy="461665"/>
           </a:xfrm>
           <a:prstGeom prst="rect">
             <a:avLst/>
@@ -14003,13 +14003,14 @@
           <a:lstStyle/>
           <a:p>
             <a:r>
-              <a:rPr lang="fr-FR" sz="2400" dirty="0" err="1"/>
+              <a:rPr lang="fr-FR" sz="2400" dirty="0" err="1" smtClean="0"/>
               <a:t>Bontron</a:t>
             </a:r>
             <a:r>
-              <a:rPr lang="fr-FR" sz="2400" dirty="0"/>
+              <a:rPr lang="fr-FR" sz="2400" dirty="0" smtClean="0"/>
               <a:t> Julien</a:t>
             </a:r>
+            <a:endParaRPr lang="fr-FR" sz="2400" dirty="0"/>
           </a:p>
         </p:txBody>
       </p:sp>
@@ -14337,6 +14338,17 @@
               <a:buNone/>
             </a:pPr>
             <a:r>
+              <a:rPr lang="fr-FR" dirty="0" smtClean="0">
+                <a:solidFill>
+                  <a:schemeClr val="accent1">
+                    <a:lumMod val="60000"/>
+                    <a:lumOff val="40000"/>
+                  </a:schemeClr>
+                </a:solidFill>
+              </a:rPr>
+              <a:t>+ supporte </a:t>
+            </a:r>
+            <a:r>
               <a:rPr lang="fr-FR" dirty="0">
                 <a:solidFill>
                   <a:schemeClr val="accent1">
@@ -14345,13 +14357,19 @@
                   </a:schemeClr>
                 </a:solidFill>
               </a:rPr>
-              <a:t>+supporte plus d’un douzaine de langage</a:t>
-            </a:r>
-          </a:p>
-          <a:p>
-            <a:pPr marL="457200" lvl="1" indent="0">
-              <a:buNone/>
-            </a:pPr>
+              <a:t>plus </a:t>
+            </a:r>
+            <a:r>
+              <a:rPr lang="fr-FR" dirty="0" smtClean="0">
+                <a:solidFill>
+                  <a:schemeClr val="accent1">
+                    <a:lumMod val="60000"/>
+                    <a:lumOff val="40000"/>
+                  </a:schemeClr>
+                </a:solidFill>
+              </a:rPr>
+              <a:t>d’une </a:t>
+            </a:r>
             <a:r>
               <a:rPr lang="fr-FR" dirty="0">
                 <a:solidFill>
@@ -14361,7 +14379,34 @@
                   </a:schemeClr>
                 </a:solidFill>
               </a:rPr>
-              <a:t>+large communauté </a:t>
+              <a:t>douzaine de langage</a:t>
+            </a:r>
+          </a:p>
+          <a:p>
+            <a:pPr marL="457200" lvl="1" indent="0">
+              <a:buNone/>
+            </a:pPr>
+            <a:r>
+              <a:rPr lang="fr-FR" dirty="0" smtClean="0">
+                <a:solidFill>
+                  <a:schemeClr val="accent1">
+                    <a:lumMod val="60000"/>
+                    <a:lumOff val="40000"/>
+                  </a:schemeClr>
+                </a:solidFill>
+              </a:rPr>
+              <a:t>+ large </a:t>
+            </a:r>
+            <a:r>
+              <a:rPr lang="fr-FR" dirty="0">
+                <a:solidFill>
+                  <a:schemeClr val="accent1">
+                    <a:lumMod val="60000"/>
+                    <a:lumOff val="40000"/>
+                  </a:schemeClr>
+                </a:solidFill>
+              </a:rPr>
+              <a:t>communauté </a:t>
             </a:r>
           </a:p>
           <a:p>
@@ -14463,7 +14508,51 @@
                   </a:schemeClr>
                 </a:solidFill>
               </a:rPr>
-              <a:t>	+ supporte de nombreux VCS (git, 	SVN, Mercurial)</a:t>
+              <a:t>	+ supporte de nombreux VCS </a:t>
+            </a:r>
+            <a:r>
+              <a:rPr lang="fr-FR" dirty="0" smtClean="0">
+                <a:solidFill>
+                  <a:schemeClr val="accent2">
+                    <a:lumMod val="40000"/>
+                    <a:lumOff val="60000"/>
+                  </a:schemeClr>
+                </a:solidFill>
+              </a:rPr>
+              <a:t>	(git</a:t>
+            </a:r>
+            <a:r>
+              <a:rPr lang="fr-FR" dirty="0">
+                <a:solidFill>
+                  <a:schemeClr val="accent2">
+                    <a:lumMod val="40000"/>
+                    <a:lumOff val="60000"/>
+                  </a:schemeClr>
+                </a:solidFill>
+              </a:rPr>
+              <a:t>, </a:t>
+            </a:r>
+            <a:r>
+              <a:rPr lang="fr-FR" dirty="0" smtClean="0">
+                <a:solidFill>
+                  <a:schemeClr val="accent2">
+                    <a:lumMod val="40000"/>
+                    <a:lumOff val="60000"/>
+                  </a:schemeClr>
+                </a:solidFill>
+              </a:rPr>
+              <a:t>SVN</a:t>
+            </a:r>
+            <a:r>
+              <a:rPr lang="fr-FR" dirty="0">
+                <a:solidFill>
+                  <a:schemeClr val="accent2">
+                    <a:lumMod val="40000"/>
+                    <a:lumOff val="60000"/>
+                  </a:schemeClr>
+                </a:solidFill>
+              </a:rPr>
+              <a:t>, Mercurial)</a:t>
             </a:r>
           </a:p>
           <a:p>
@@ -14828,8 +14917,12 @@
           </a:p>
           <a:p>
             <a:r>
+              <a:rPr lang="fr-FR" dirty="0" smtClean="0"/>
+              <a:t>Rapprocher </a:t>
+            </a:r>
+            <a:r>
               <a:rPr lang="fr-FR" dirty="0"/>
-              <a:t>Rapproché ce projet du cours sur Docker que nous avions eu en début de semestre </a:t>
+              <a:t>ce projet du cours sur Docker que nous avions eu en début de semestre </a:t>
             </a:r>
           </a:p>
           <a:p>
@@ -15017,13 +15110,18 @@
             <p:ph type="ftr" sz="quarter" idx="11"/>
           </p:nvPr>
         </p:nvSpPr>
-        <p:spPr/>
+        <p:spPr>
+          <a:xfrm>
+            <a:off x="1117661" y="5984787"/>
+            <a:ext cx="6239309" cy="365125"/>
+          </a:xfrm>
+        </p:spPr>
         <p:txBody>
           <a:bodyPr/>
           <a:lstStyle/>
           <a:p>
             <a:r>
-              <a:rPr lang="fr-FR"/>
+              <a:rPr lang="fr-FR" dirty="0"/>
               <a:t>29/11/2017</a:t>
             </a:r>
           </a:p>
@@ -15045,7 +15143,12 @@
             <p:ph type="sldNum" sz="quarter" idx="12"/>
           </p:nvPr>
         </p:nvSpPr>
-        <p:spPr/>
+        <p:spPr>
+          <a:xfrm>
+            <a:off x="10383199" y="5984787"/>
+            <a:ext cx="771089" cy="365125"/>
+          </a:xfrm>
+        </p:spPr>
         <p:txBody>
           <a:bodyPr/>
           <a:lstStyle/>
@@ -15055,7 +15158,7 @@
               <a:pPr/>
               <a:t>13</a:t>
             </a:fld>
-            <a:endParaRPr lang="fr-FR"/>
+            <a:endParaRPr lang="fr-FR" dirty="0"/>
           </a:p>
         </p:txBody>
       </p:sp>
@@ -15669,8 +15772,27 @@
                   </a:schemeClr>
                 </a:solidFill>
               </a:rPr>
-              <a:t>- Manque de robustesse avec de forte volumétrie </a:t>
-            </a:r>
+              <a:t>- Manque de robustesse avec de </a:t>
+            </a:r>
+            <a:r>
+              <a:rPr lang="fr-FR" dirty="0" smtClean="0">
+                <a:solidFill>
+                  <a:schemeClr val="accent2">
+                    <a:lumMod val="40000"/>
+                    <a:lumOff val="60000"/>
+                  </a:schemeClr>
+                </a:solidFill>
+              </a:rPr>
+              <a:t>fortes volumétries </a:t>
+            </a:r>
+            <a:endParaRPr lang="fr-FR" dirty="0">
+              <a:solidFill>
+                <a:schemeClr val="accent2">
+                  <a:lumMod val="40000"/>
+                  <a:lumOff val="60000"/>
+                </a:schemeClr>
+              </a:solidFill>
+            </a:endParaRPr>
           </a:p>
           <a:p>
             <a:r>
@@ -15744,7 +15866,29 @@
                   </a:schemeClr>
                 </a:solidFill>
               </a:rPr>
-              <a:t>+ Non relationnel de base mais peu le devenir</a:t>
+              <a:t>+ Non relationnel de base mais </a:t>
+            </a:r>
+            <a:r>
+              <a:rPr lang="fr-FR" dirty="0" smtClean="0">
+                <a:solidFill>
+                  <a:schemeClr val="accent1">
+                    <a:lumMod val="60000"/>
+                    <a:lumOff val="40000"/>
+                  </a:schemeClr>
+                </a:solidFill>
+              </a:rPr>
+              <a:t>peut </a:t>
+            </a:r>
+            <a:r>
+              <a:rPr lang="fr-FR" dirty="0">
+                <a:solidFill>
+                  <a:schemeClr val="accent1">
+                    <a:lumMod val="60000"/>
+                    <a:lumOff val="40000"/>
+                  </a:schemeClr>
+                </a:solidFill>
+              </a:rPr>
+              <a:t>le devenir</a:t>
             </a:r>
           </a:p>
           <a:p>
@@ -15842,8 +15986,27 @@
                   </a:schemeClr>
                 </a:solidFill>
               </a:rPr>
-              <a:t>- Manque de robustesse avec de forte volumétrie</a:t>
-            </a:r>
+              <a:t>- Manque de robustesse avec de </a:t>
+            </a:r>
+            <a:r>
+              <a:rPr lang="fr-FR" dirty="0" smtClean="0">
+                <a:solidFill>
+                  <a:schemeClr val="accent2">
+                    <a:lumMod val="40000"/>
+                    <a:lumOff val="60000"/>
+                  </a:schemeClr>
+                </a:solidFill>
+              </a:rPr>
+              <a:t>fortes volumétries</a:t>
+            </a:r>
+            <a:endParaRPr lang="fr-FR" dirty="0">
+              <a:solidFill>
+                <a:schemeClr val="accent2">
+                  <a:lumMod val="40000"/>
+                  <a:lumOff val="60000"/>
+                </a:schemeClr>
+              </a:solidFill>
+            </a:endParaRPr>
           </a:p>
           <a:p>
             <a:pPr lvl="0"/>
@@ -15910,7 +16073,29 @@
                   </a:schemeClr>
                 </a:solidFill>
               </a:rPr>
-              <a:t>+ Non relationnel de base mais peu le devenir</a:t>
+              <a:t>+ Non relationnel de base mais </a:t>
+            </a:r>
+            <a:r>
+              <a:rPr lang="fr-FR" dirty="0" smtClean="0">
+                <a:solidFill>
+                  <a:schemeClr val="accent2">
+                    <a:lumMod val="40000"/>
+                    <a:lumOff val="60000"/>
+                  </a:schemeClr>
+                </a:solidFill>
+              </a:rPr>
+              <a:t>peut </a:t>
+            </a:r>
+            <a:r>
+              <a:rPr lang="fr-FR" dirty="0">
+                <a:solidFill>
+                  <a:schemeClr val="accent2">
+                    <a:lumMod val="40000"/>
+                    <a:lumOff val="60000"/>
+                  </a:schemeClr>
+                </a:solidFill>
+              </a:rPr>
+              <a:t>le devenir</a:t>
             </a:r>
           </a:p>
           <a:p>

</xml_diff>